<commit_message>
Add DataField class (#35)
* Add DataField.java

* Update Name class to inherit from DataField

* Rename variable Name.fullName to Name.value

* Update Phone class to inherit from DataField

* Correct indentation in Phone.java

* Update Email classs to inherit from DataField

* Update Address class to inherit from DataField

* Update Tag class to inherit from DataField

* Rename Tag.tagName to Tag.value

* Update Model class diagram in docs

* Correct comments and checkstyle errors in DataField.java

* Correct indentations in Phone.java and Email.java
</commit_message>
<xml_diff>
--- a/docs/diagrams/ModelComponentClassDiagram.pptx
+++ b/docs/diagrams/ModelComponentClassDiagram.pptx
@@ -208,7 +208,7 @@
           <a:p>
             <a:fld id="{F5CC4B3F-88C1-4FFA-B1B6-F41C21DC6924}" type="datetimeFigureOut">
               <a:rPr lang="en-US" smtClean="0"/>
-              <a:t>6/27/2018</a:t>
+              <a:t>10/7/2018</a:t>
             </a:fld>
             <a:endParaRPr lang="en-US"/>
           </a:p>
@@ -654,7 +654,7 @@
           <a:p>
             <a:fld id="{78C97017-6FC3-485B-9764-EAC9E56C1D49}" type="datetimeFigureOut">
               <a:rPr lang="en-US" smtClean="0"/>
-              <a:t>6/27/2018</a:t>
+              <a:t>10/7/2018</a:t>
             </a:fld>
             <a:endParaRPr lang="en-US"/>
           </a:p>
@@ -822,7 +822,7 @@
           <a:p>
             <a:fld id="{78C97017-6FC3-485B-9764-EAC9E56C1D49}" type="datetimeFigureOut">
               <a:rPr lang="en-US" smtClean="0"/>
-              <a:t>6/27/2018</a:t>
+              <a:t>10/7/2018</a:t>
             </a:fld>
             <a:endParaRPr lang="en-US"/>
           </a:p>
@@ -1000,7 +1000,7 @@
           <a:p>
             <a:fld id="{78C97017-6FC3-485B-9764-EAC9E56C1D49}" type="datetimeFigureOut">
               <a:rPr lang="en-US" smtClean="0"/>
-              <a:t>6/27/2018</a:t>
+              <a:t>10/7/2018</a:t>
             </a:fld>
             <a:endParaRPr lang="en-US"/>
           </a:p>
@@ -1168,7 +1168,7 @@
           <a:p>
             <a:fld id="{78C97017-6FC3-485B-9764-EAC9E56C1D49}" type="datetimeFigureOut">
               <a:rPr lang="en-US" smtClean="0"/>
-              <a:t>6/27/2018</a:t>
+              <a:t>10/7/2018</a:t>
             </a:fld>
             <a:endParaRPr lang="en-US"/>
           </a:p>
@@ -1413,7 +1413,7 @@
           <a:p>
             <a:fld id="{78C97017-6FC3-485B-9764-EAC9E56C1D49}" type="datetimeFigureOut">
               <a:rPr lang="en-US" smtClean="0"/>
-              <a:t>6/27/2018</a:t>
+              <a:t>10/7/2018</a:t>
             </a:fld>
             <a:endParaRPr lang="en-US"/>
           </a:p>
@@ -1698,7 +1698,7 @@
           <a:p>
             <a:fld id="{78C97017-6FC3-485B-9764-EAC9E56C1D49}" type="datetimeFigureOut">
               <a:rPr lang="en-US" smtClean="0"/>
-              <a:t>6/27/2018</a:t>
+              <a:t>10/7/2018</a:t>
             </a:fld>
             <a:endParaRPr lang="en-US"/>
           </a:p>
@@ -2117,7 +2117,7 @@
           <a:p>
             <a:fld id="{78C97017-6FC3-485B-9764-EAC9E56C1D49}" type="datetimeFigureOut">
               <a:rPr lang="en-US" smtClean="0"/>
-              <a:t>6/27/2018</a:t>
+              <a:t>10/7/2018</a:t>
             </a:fld>
             <a:endParaRPr lang="en-US"/>
           </a:p>
@@ -2234,7 +2234,7 @@
           <a:p>
             <a:fld id="{78C97017-6FC3-485B-9764-EAC9E56C1D49}" type="datetimeFigureOut">
               <a:rPr lang="en-US" smtClean="0"/>
-              <a:t>6/27/2018</a:t>
+              <a:t>10/7/2018</a:t>
             </a:fld>
             <a:endParaRPr lang="en-US"/>
           </a:p>
@@ -2329,7 +2329,7 @@
           <a:p>
             <a:fld id="{78C97017-6FC3-485B-9764-EAC9E56C1D49}" type="datetimeFigureOut">
               <a:rPr lang="en-US" smtClean="0"/>
-              <a:t>6/27/2018</a:t>
+              <a:t>10/7/2018</a:t>
             </a:fld>
             <a:endParaRPr lang="en-US"/>
           </a:p>
@@ -2604,7 +2604,7 @@
           <a:p>
             <a:fld id="{78C97017-6FC3-485B-9764-EAC9E56C1D49}" type="datetimeFigureOut">
               <a:rPr lang="en-US" smtClean="0"/>
-              <a:t>6/27/2018</a:t>
+              <a:t>10/7/2018</a:t>
             </a:fld>
             <a:endParaRPr lang="en-US"/>
           </a:p>
@@ -2856,7 +2856,7 @@
           <a:p>
             <a:fld id="{78C97017-6FC3-485B-9764-EAC9E56C1D49}" type="datetimeFigureOut">
               <a:rPr lang="en-US" smtClean="0"/>
-              <a:t>6/27/2018</a:t>
+              <a:t>10/7/2018</a:t>
             </a:fld>
             <a:endParaRPr lang="en-US"/>
           </a:p>
@@ -3067,7 +3067,7 @@
           <a:p>
             <a:fld id="{78C97017-6FC3-485B-9764-EAC9E56C1D49}" type="datetimeFigureOut">
               <a:rPr lang="en-US" smtClean="0"/>
-              <a:t>6/27/2018</a:t>
+              <a:t>10/7/2018</a:t>
             </a:fld>
             <a:endParaRPr lang="en-US"/>
           </a:p>
@@ -3450,8 +3450,8 @@
         </p:nvSpPr>
         <p:spPr>
           <a:xfrm>
-            <a:off x="1119865" y="1600200"/>
-            <a:ext cx="7490735" cy="3124200"/>
+            <a:off x="381000" y="1339853"/>
+            <a:ext cx="8458200" cy="3403260"/>
           </a:xfrm>
           <a:prstGeom prst="roundRect">
             <a:avLst>
@@ -3511,7 +3511,7 @@
         </p:nvSpPr>
         <p:spPr>
           <a:xfrm>
-            <a:off x="2877180" y="3463240"/>
+            <a:off x="2138315" y="3463240"/>
             <a:ext cx="1093635" cy="346760"/>
           </a:xfrm>
           <a:prstGeom prst="rect">
@@ -3570,7 +3570,7 @@
         </p:nvSpPr>
         <p:spPr>
           <a:xfrm rot="16200000">
-            <a:off x="1661548" y="3097750"/>
+            <a:off x="922683" y="3097750"/>
             <a:ext cx="1093635" cy="346760"/>
           </a:xfrm>
           <a:prstGeom prst="rect">
@@ -3633,7 +3633,7 @@
         </p:nvCxnSpPr>
         <p:spPr>
           <a:xfrm rot="5400000" flipH="1" flipV="1">
-            <a:off x="4131507" y="1281685"/>
+            <a:off x="3392642" y="1281685"/>
             <a:ext cx="613122" cy="4459404"/>
           </a:xfrm>
           <a:prstGeom prst="bentConnector3">
@@ -3674,7 +3674,7 @@
         </p:nvSpPr>
         <p:spPr>
           <a:xfrm rot="16200000">
-            <a:off x="956202" y="2861202"/>
+            <a:off x="217337" y="2861202"/>
             <a:ext cx="1093635" cy="346760"/>
           </a:xfrm>
           <a:prstGeom prst="rect">
@@ -3744,7 +3744,7 @@
         </p:nvSpPr>
         <p:spPr>
           <a:xfrm rot="16200000">
-            <a:off x="1626910" y="2952291"/>
+            <a:off x="888045" y="2952291"/>
             <a:ext cx="270504" cy="175523"/>
           </a:xfrm>
           <a:prstGeom prst="triangle">
@@ -3794,7 +3794,7 @@
         </p:nvCxnSpPr>
         <p:spPr>
           <a:xfrm>
-            <a:off x="2609828" y="3636620"/>
+            <a:off x="1870963" y="3636620"/>
             <a:ext cx="267352" cy="0"/>
           </a:xfrm>
           <a:prstGeom prst="straightConnector1">
@@ -3832,7 +3832,7 @@
         </p:nvCxnSpPr>
         <p:spPr>
           <a:xfrm>
-            <a:off x="910091" y="3040053"/>
+            <a:off x="171226" y="3040053"/>
             <a:ext cx="419548" cy="2860"/>
           </a:xfrm>
           <a:prstGeom prst="bentConnector3">
@@ -3877,7 +3877,7 @@
         </p:nvCxnSpPr>
         <p:spPr>
           <a:xfrm flipV="1">
-            <a:off x="1849924" y="3040052"/>
+            <a:off x="1111059" y="3040052"/>
             <a:ext cx="216105" cy="1"/>
           </a:xfrm>
           <a:prstGeom prst="line">
@@ -3916,7 +3916,7 @@
         </p:nvSpPr>
         <p:spPr>
           <a:xfrm>
-            <a:off x="2373780" y="3549930"/>
+            <a:off x="1634915" y="3549930"/>
             <a:ext cx="236048" cy="173380"/>
           </a:xfrm>
           <a:prstGeom prst="flowChartDecision">
@@ -3961,7 +3961,7 @@
         </p:nvSpPr>
         <p:spPr>
           <a:xfrm>
-            <a:off x="2825280" y="2846162"/>
+            <a:off x="2086415" y="2846162"/>
             <a:ext cx="1490560" cy="334856"/>
           </a:xfrm>
           <a:prstGeom prst="rect">
@@ -3994,7 +3994,7 @@
           <a:p>
             <a:pPr algn="ctr"/>
             <a:r>
-              <a:rPr lang="en-US" sz="1050" dirty="0" err="1" smtClean="0">
+              <a:rPr lang="en-US" sz="1050" dirty="0" err="1">
                 <a:solidFill>
                   <a:srgbClr val="7030A0"/>
                 </a:solidFill>
@@ -4020,7 +4020,7 @@
         </p:nvCxnSpPr>
         <p:spPr>
           <a:xfrm>
-            <a:off x="2624360" y="3003033"/>
+            <a:off x="1885495" y="3003033"/>
             <a:ext cx="200920" cy="10557"/>
           </a:xfrm>
           <a:prstGeom prst="straightConnector1">
@@ -4058,7 +4058,7 @@
         </p:nvSpPr>
         <p:spPr>
           <a:xfrm>
-            <a:off x="2388312" y="2916343"/>
+            <a:off x="1649447" y="2916343"/>
             <a:ext cx="236048" cy="173380"/>
           </a:xfrm>
           <a:prstGeom prst="flowChartDecision">
@@ -4103,7 +4103,7 @@
         </p:nvSpPr>
         <p:spPr>
           <a:xfrm>
-            <a:off x="4692650" y="2846162"/>
+            <a:off x="3953785" y="2846162"/>
             <a:ext cx="1156969" cy="346760"/>
           </a:xfrm>
           <a:prstGeom prst="rect">
@@ -4141,7 +4141,7 @@
                   <a:srgbClr val="7030A0"/>
                 </a:solidFill>
               </a:rPr>
-              <a:t>UniquePersonList</a:t>
+              <a:t>UniqueLoanList</a:t>
             </a:r>
             <a:endParaRPr lang="en-SG" sz="1050" dirty="0">
               <a:solidFill>
@@ -4159,7 +4159,7 @@
         </p:nvSpPr>
         <p:spPr>
           <a:xfrm>
-            <a:off x="4324972" y="2920532"/>
+            <a:off x="3586107" y="2920532"/>
             <a:ext cx="236048" cy="173380"/>
           </a:xfrm>
           <a:prstGeom prst="flowChartDecision">
@@ -4206,7 +4206,7 @@
         </p:nvSpPr>
         <p:spPr>
           <a:xfrm>
-            <a:off x="6313677" y="2858066"/>
+            <a:off x="5574812" y="2858066"/>
             <a:ext cx="708186" cy="346760"/>
           </a:xfrm>
           <a:prstGeom prst="rect">
@@ -4244,7 +4244,7 @@
                   <a:srgbClr val="7030A0"/>
                 </a:solidFill>
               </a:rPr>
-              <a:t>Person</a:t>
+              <a:t>Loan</a:t>
             </a:r>
             <a:endParaRPr lang="en-SG" sz="1050" dirty="0">
               <a:solidFill>
@@ -4262,7 +4262,7 @@
         </p:nvSpPr>
         <p:spPr>
           <a:xfrm>
-            <a:off x="5858751" y="2941676"/>
+            <a:off x="5119886" y="2941676"/>
             <a:ext cx="236048" cy="173380"/>
           </a:xfrm>
           <a:prstGeom prst="flowChartDecision">
@@ -4310,7 +4310,7 @@
         </p:nvCxnSpPr>
         <p:spPr>
           <a:xfrm>
-            <a:off x="6094799" y="3028366"/>
+            <a:off x="5355934" y="3028366"/>
             <a:ext cx="218878" cy="3080"/>
           </a:xfrm>
           <a:prstGeom prst="bentConnector3">
@@ -4348,7 +4348,7 @@
         </p:nvSpPr>
         <p:spPr>
           <a:xfrm>
-            <a:off x="7712397" y="2564238"/>
+            <a:off x="6973532" y="2564238"/>
             <a:ext cx="708186" cy="285783"/>
           </a:xfrm>
           <a:prstGeom prst="rect">
@@ -4404,7 +4404,7 @@
         </p:nvSpPr>
         <p:spPr>
           <a:xfrm>
-            <a:off x="7041947" y="2948201"/>
+            <a:off x="6303082" y="2948201"/>
             <a:ext cx="236048" cy="173380"/>
           </a:xfrm>
           <a:prstGeom prst="flowChartDecision">
@@ -4453,7 +4453,7 @@
         </p:nvCxnSpPr>
         <p:spPr>
           <a:xfrm flipV="1">
-            <a:off x="7277995" y="2706821"/>
+            <a:off x="6539130" y="2706821"/>
             <a:ext cx="434402" cy="327761"/>
           </a:xfrm>
           <a:prstGeom prst="bentConnector3">
@@ -4491,7 +4491,7 @@
         </p:nvSpPr>
         <p:spPr>
           <a:xfrm>
-            <a:off x="7712397" y="2887216"/>
+            <a:off x="6973532" y="2887216"/>
             <a:ext cx="708186" cy="285783"/>
           </a:xfrm>
           <a:prstGeom prst="rect">
@@ -4550,7 +4550,7 @@
         </p:nvCxnSpPr>
         <p:spPr>
           <a:xfrm flipV="1">
-            <a:off x="7277995" y="3030108"/>
+            <a:off x="6539130" y="3030108"/>
             <a:ext cx="434402" cy="4783"/>
           </a:xfrm>
           <a:prstGeom prst="bentConnector3">
@@ -4588,7 +4588,7 @@
         </p:nvSpPr>
         <p:spPr>
           <a:xfrm>
-            <a:off x="7712397" y="3210194"/>
+            <a:off x="6973532" y="3210194"/>
             <a:ext cx="708186" cy="285783"/>
           </a:xfrm>
           <a:prstGeom prst="rect">
@@ -4647,7 +4647,7 @@
         </p:nvCxnSpPr>
         <p:spPr>
           <a:xfrm>
-            <a:off x="7277995" y="3034891"/>
+            <a:off x="6539130" y="3034891"/>
             <a:ext cx="434402" cy="318195"/>
           </a:xfrm>
           <a:prstGeom prst="bentConnector3">
@@ -4685,7 +4685,7 @@
         </p:nvSpPr>
         <p:spPr>
           <a:xfrm>
-            <a:off x="7712397" y="3533171"/>
+            <a:off x="6973532" y="3533171"/>
             <a:ext cx="708186" cy="285783"/>
           </a:xfrm>
           <a:prstGeom prst="rect">
@@ -4744,7 +4744,7 @@
         </p:nvCxnSpPr>
         <p:spPr>
           <a:xfrm>
-            <a:off x="7277995" y="3034891"/>
+            <a:off x="6539130" y="3034891"/>
             <a:ext cx="434402" cy="641172"/>
           </a:xfrm>
           <a:prstGeom prst="bentConnector3">
@@ -4784,7 +4784,7 @@
         </p:nvCxnSpPr>
         <p:spPr>
           <a:xfrm rot="5400000">
-            <a:off x="3553611" y="2687559"/>
+            <a:off x="2814746" y="2687559"/>
             <a:ext cx="293825" cy="5938"/>
           </a:xfrm>
           <a:prstGeom prst="bentConnector3">
@@ -4825,7 +4825,7 @@
         </p:nvSpPr>
         <p:spPr>
           <a:xfrm rot="10800000" flipV="1">
-            <a:off x="3562299" y="2386554"/>
+            <a:off x="2823434" y="2386554"/>
             <a:ext cx="282387" cy="157062"/>
           </a:xfrm>
           <a:prstGeom prst="triangle">
@@ -4873,7 +4873,7 @@
         </p:nvSpPr>
         <p:spPr>
           <a:xfrm>
-            <a:off x="1260922" y="1998350"/>
+            <a:off x="522057" y="1998350"/>
             <a:ext cx="1443661" cy="364396"/>
           </a:xfrm>
           <a:prstGeom prst="rect">
@@ -4944,7 +4944,7 @@
         </p:nvSpPr>
         <p:spPr>
           <a:xfrm rot="16200000">
-            <a:off x="6362886" y="3586305"/>
+            <a:off x="5624021" y="3586305"/>
             <a:ext cx="881018" cy="261610"/>
           </a:xfrm>
           <a:prstGeom prst="rect">
@@ -4983,7 +4983,7 @@
         </p:nvSpPr>
         <p:spPr>
           <a:xfrm>
-            <a:off x="2057401" y="4239491"/>
+            <a:off x="1318536" y="4239491"/>
             <a:ext cx="1066800" cy="346760"/>
           </a:xfrm>
           <a:prstGeom prst="rect">
@@ -5023,14 +5023,6 @@
               </a:rPr>
               <a:t>&lt;&lt;interface&gt;&gt;</a:t>
             </a:r>
-            <a:r>
-              <a:rPr lang="en-US" sz="1050">
-                <a:solidFill>
-                  <a:srgbClr val="7030A0"/>
-                </a:solidFill>
-              </a:rPr>
-              <a:t/>
-            </a:r>
             <a:br>
               <a:rPr lang="en-US" sz="1050">
                 <a:solidFill>
@@ -5065,7 +5057,7 @@
         </p:nvCxnSpPr>
         <p:spPr>
           <a:xfrm rot="16200000" flipH="1">
-            <a:off x="1364475" y="3719944"/>
+            <a:off x="625610" y="3719944"/>
             <a:ext cx="831471" cy="554381"/>
           </a:xfrm>
           <a:prstGeom prst="bentConnector2">
@@ -5104,7 +5096,7 @@
         </p:nvSpPr>
         <p:spPr>
           <a:xfrm>
-            <a:off x="4429979" y="3111479"/>
+            <a:off x="3691114" y="3111479"/>
             <a:ext cx="189257" cy="178683"/>
           </a:xfrm>
           <a:prstGeom prst="rect">
@@ -5143,7 +5135,7 @@
         </p:nvSpPr>
         <p:spPr>
           <a:xfrm>
-            <a:off x="6135256" y="3097917"/>
+            <a:off x="5396391" y="3097917"/>
             <a:ext cx="189257" cy="178683"/>
           </a:xfrm>
           <a:prstGeom prst="rect">
@@ -5182,7 +5174,7 @@
         </p:nvSpPr>
         <p:spPr>
           <a:xfrm>
-            <a:off x="2573394" y="2756715"/>
+            <a:off x="1834529" y="2756715"/>
             <a:ext cx="170110" cy="137542"/>
           </a:xfrm>
           <a:prstGeom prst="rect">
@@ -5221,7 +5213,7 @@
         </p:nvSpPr>
         <p:spPr>
           <a:xfrm>
-            <a:off x="2707070" y="3667737"/>
+            <a:off x="1968205" y="3667737"/>
             <a:ext cx="189257" cy="178683"/>
           </a:xfrm>
           <a:prstGeom prst="rect">
@@ -5260,7 +5252,7 @@
         </p:nvSpPr>
         <p:spPr>
           <a:xfrm>
-            <a:off x="6449896" y="3204826"/>
+            <a:off x="5711031" y="3204826"/>
             <a:ext cx="189257" cy="178683"/>
           </a:xfrm>
           <a:prstGeom prst="rect">
@@ -5305,7 +5297,7 @@
         </p:nvSpPr>
         <p:spPr>
           <a:xfrm>
-            <a:off x="7712397" y="2228817"/>
+            <a:off x="6973532" y="2228817"/>
             <a:ext cx="708186" cy="285783"/>
           </a:xfrm>
           <a:prstGeom prst="rect">
@@ -5371,7 +5363,7 @@
         </p:nvCxnSpPr>
         <p:spPr>
           <a:xfrm flipV="1">
-            <a:off x="7277995" y="2371709"/>
+            <a:off x="6539130" y="2371709"/>
             <a:ext cx="434402" cy="663182"/>
           </a:xfrm>
           <a:prstGeom prst="bentConnector3">
@@ -5417,7 +5409,7 @@
         </p:nvSpPr>
         <p:spPr>
           <a:xfrm>
-            <a:off x="7466243" y="2255711"/>
+            <a:off x="6727378" y="2255711"/>
             <a:ext cx="189257" cy="178683"/>
           </a:xfrm>
           <a:prstGeom prst="rect">
@@ -5456,7 +5448,7 @@
         </p:nvSpPr>
         <p:spPr>
           <a:xfrm>
-            <a:off x="3170181" y="1998350"/>
+            <a:off x="2431316" y="1998350"/>
             <a:ext cx="1060683" cy="364396"/>
           </a:xfrm>
           <a:prstGeom prst="rect">
@@ -5515,7 +5507,7 @@
         </p:nvCxnSpPr>
         <p:spPr>
           <a:xfrm>
-            <a:off x="4324972" y="3007222"/>
+            <a:off x="3586107" y="3007222"/>
             <a:ext cx="367678" cy="12320"/>
           </a:xfrm>
           <a:prstGeom prst="straightConnector1">
@@ -5553,7 +5545,7 @@
         </p:nvSpPr>
         <p:spPr>
           <a:xfrm rot="16200000">
-            <a:off x="2669073" y="2069158"/>
+            <a:off x="1930208" y="2069158"/>
             <a:ext cx="271014" cy="187417"/>
           </a:xfrm>
           <a:prstGeom prst="triangle">
@@ -5608,7 +5600,7 @@
         </p:nvCxnSpPr>
         <p:spPr>
           <a:xfrm>
-            <a:off x="2898289" y="2177727"/>
+            <a:off x="2159424" y="2177727"/>
             <a:ext cx="271892" cy="2821"/>
           </a:xfrm>
           <a:prstGeom prst="bentConnector3">
@@ -5641,6 +5633,377 @@
           </a:fontRef>
         </p:style>
       </p:cxnSp>
+      <p:sp>
+        <p:nvSpPr>
+          <p:cNvPr id="56" name="Rectangle 8">
+            <a:extLst>
+              <a:ext uri="{FF2B5EF4-FFF2-40B4-BE49-F238E27FC236}">
+                <a16:creationId xmlns:a16="http://schemas.microsoft.com/office/drawing/2014/main" id="{7C242852-2260-4B53-B3D0-1F9D384D8359}"/>
+              </a:ext>
+            </a:extLst>
+          </p:cNvPr>
+          <p:cNvSpPr/>
+          <p:nvPr/>
+        </p:nvSpPr>
+        <p:spPr>
+          <a:xfrm>
+            <a:off x="7608038" y="1594426"/>
+            <a:ext cx="998782" cy="442264"/>
+          </a:xfrm>
+          <a:prstGeom prst="rect">
+            <a:avLst/>
+          </a:prstGeom>
+          <a:ln w="19050">
+            <a:solidFill>
+              <a:srgbClr val="7030A0"/>
+            </a:solidFill>
+          </a:ln>
+          <a:effectLst/>
+        </p:spPr>
+        <p:style>
+          <a:lnRef idx="1">
+            <a:schemeClr val="accent4"/>
+          </a:lnRef>
+          <a:fillRef idx="2">
+            <a:schemeClr val="accent4"/>
+          </a:fillRef>
+          <a:effectRef idx="1">
+            <a:schemeClr val="accent4"/>
+          </a:effectRef>
+          <a:fontRef idx="minor">
+            <a:schemeClr val="dk1"/>
+          </a:fontRef>
+        </p:style>
+        <p:txBody>
+          <a:bodyPr rtlCol="0" anchor="ctr"/>
+          <a:lstStyle/>
+          <a:p>
+            <a:pPr algn="ctr"/>
+            <a:r>
+              <a:rPr lang="en-US" sz="1050" dirty="0">
+                <a:solidFill>
+                  <a:srgbClr val="7030A0"/>
+                </a:solidFill>
+              </a:rPr>
+              <a:t>{abstract}</a:t>
+            </a:r>
+          </a:p>
+          <a:p>
+            <a:pPr algn="ctr"/>
+            <a:r>
+              <a:rPr lang="en-US" sz="1050" dirty="0" err="1">
+                <a:solidFill>
+                  <a:srgbClr val="7030A0"/>
+                </a:solidFill>
+              </a:rPr>
+              <a:t>DataField</a:t>
+            </a:r>
+            <a:endParaRPr lang="en-US" sz="1050" dirty="0">
+              <a:solidFill>
+                <a:srgbClr val="7030A0"/>
+              </a:solidFill>
+            </a:endParaRPr>
+          </a:p>
+        </p:txBody>
+      </p:sp>
+      <p:cxnSp>
+        <p:nvCxnSpPr>
+          <p:cNvPr id="57" name="Elbow Connector 106">
+            <a:extLst>
+              <a:ext uri="{FF2B5EF4-FFF2-40B4-BE49-F238E27FC236}">
+                <a16:creationId xmlns:a16="http://schemas.microsoft.com/office/drawing/2014/main" id="{07D7295B-5C2D-425A-9895-0197F8048D91}"/>
+              </a:ext>
+            </a:extLst>
+          </p:cNvPr>
+          <p:cNvCxnSpPr>
+            <a:cxnSpLocks/>
+            <a:stCxn id="52" idx="3"/>
+            <a:endCxn id="56" idx="2"/>
+          </p:cNvCxnSpPr>
+          <p:nvPr/>
+        </p:nvCxnSpPr>
+        <p:spPr>
+          <a:xfrm flipV="1">
+            <a:off x="7681718" y="2036690"/>
+            <a:ext cx="425711" cy="335019"/>
+          </a:xfrm>
+          <a:prstGeom prst="bentConnector2">
+            <a:avLst/>
+          </a:prstGeom>
+          <a:ln w="19050">
+            <a:solidFill>
+              <a:srgbClr val="7030A0"/>
+            </a:solidFill>
+            <a:prstDash val="solid"/>
+            <a:headEnd type="none" w="med" len="med"/>
+            <a:tailEnd type="triangle" w="med" len="med"/>
+          </a:ln>
+          <a:effectLst/>
+        </p:spPr>
+        <p:style>
+          <a:lnRef idx="1">
+            <a:schemeClr val="accent2"/>
+          </a:lnRef>
+          <a:fillRef idx="2">
+            <a:schemeClr val="accent2"/>
+          </a:fillRef>
+          <a:effectRef idx="1">
+            <a:schemeClr val="accent2"/>
+          </a:effectRef>
+          <a:fontRef idx="minor">
+            <a:schemeClr val="dk1"/>
+          </a:fontRef>
+        </p:style>
+      </p:cxnSp>
+      <p:cxnSp>
+        <p:nvCxnSpPr>
+          <p:cNvPr id="71" name="Elbow Connector 106">
+            <a:extLst>
+              <a:ext uri="{FF2B5EF4-FFF2-40B4-BE49-F238E27FC236}">
+                <a16:creationId xmlns:a16="http://schemas.microsoft.com/office/drawing/2014/main" id="{BB44A3CD-63F5-4EEE-9102-3051C3296A6B}"/>
+              </a:ext>
+            </a:extLst>
+          </p:cNvPr>
+          <p:cNvCxnSpPr>
+            <a:cxnSpLocks/>
+            <a:stCxn id="76" idx="3"/>
+            <a:endCxn id="56" idx="2"/>
+          </p:cNvCxnSpPr>
+          <p:nvPr/>
+        </p:nvCxnSpPr>
+        <p:spPr>
+          <a:xfrm flipV="1">
+            <a:off x="7681718" y="2036690"/>
+            <a:ext cx="425711" cy="670440"/>
+          </a:xfrm>
+          <a:prstGeom prst="bentConnector2">
+            <a:avLst/>
+          </a:prstGeom>
+          <a:ln w="19050">
+            <a:solidFill>
+              <a:srgbClr val="7030A0"/>
+            </a:solidFill>
+            <a:prstDash val="solid"/>
+            <a:headEnd type="none" w="med" len="med"/>
+            <a:tailEnd type="triangle" w="med" len="med"/>
+          </a:ln>
+          <a:effectLst/>
+        </p:spPr>
+        <p:style>
+          <a:lnRef idx="1">
+            <a:schemeClr val="accent2"/>
+          </a:lnRef>
+          <a:fillRef idx="2">
+            <a:schemeClr val="accent2"/>
+          </a:fillRef>
+          <a:effectRef idx="1">
+            <a:schemeClr val="accent2"/>
+          </a:effectRef>
+          <a:fontRef idx="minor">
+            <a:schemeClr val="dk1"/>
+          </a:fontRef>
+        </p:style>
+      </p:cxnSp>
+      <p:cxnSp>
+        <p:nvCxnSpPr>
+          <p:cNvPr id="72" name="Elbow Connector 106">
+            <a:extLst>
+              <a:ext uri="{FF2B5EF4-FFF2-40B4-BE49-F238E27FC236}">
+                <a16:creationId xmlns:a16="http://schemas.microsoft.com/office/drawing/2014/main" id="{FD78641A-8B9A-4AA5-B198-8676613C093F}"/>
+              </a:ext>
+            </a:extLst>
+          </p:cNvPr>
+          <p:cNvCxnSpPr>
+            <a:cxnSpLocks/>
+            <a:stCxn id="80" idx="3"/>
+            <a:endCxn id="56" idx="2"/>
+          </p:cNvCxnSpPr>
+          <p:nvPr/>
+        </p:nvCxnSpPr>
+        <p:spPr>
+          <a:xfrm flipV="1">
+            <a:off x="7681718" y="2036690"/>
+            <a:ext cx="425711" cy="993418"/>
+          </a:xfrm>
+          <a:prstGeom prst="bentConnector2">
+            <a:avLst/>
+          </a:prstGeom>
+          <a:ln w="19050">
+            <a:solidFill>
+              <a:srgbClr val="7030A0"/>
+            </a:solidFill>
+            <a:prstDash val="solid"/>
+            <a:headEnd type="none" w="med" len="med"/>
+            <a:tailEnd type="triangle" w="med" len="med"/>
+          </a:ln>
+          <a:effectLst/>
+        </p:spPr>
+        <p:style>
+          <a:lnRef idx="1">
+            <a:schemeClr val="accent2"/>
+          </a:lnRef>
+          <a:fillRef idx="2">
+            <a:schemeClr val="accent2"/>
+          </a:fillRef>
+          <a:effectRef idx="1">
+            <a:schemeClr val="accent2"/>
+          </a:effectRef>
+          <a:fontRef idx="minor">
+            <a:schemeClr val="dk1"/>
+          </a:fontRef>
+        </p:style>
+      </p:cxnSp>
+      <p:cxnSp>
+        <p:nvCxnSpPr>
+          <p:cNvPr id="73" name="Elbow Connector 106">
+            <a:extLst>
+              <a:ext uri="{FF2B5EF4-FFF2-40B4-BE49-F238E27FC236}">
+                <a16:creationId xmlns:a16="http://schemas.microsoft.com/office/drawing/2014/main" id="{5CFC7354-B732-4B87-A033-0A8A7E51163B}"/>
+              </a:ext>
+            </a:extLst>
+          </p:cNvPr>
+          <p:cNvCxnSpPr>
+            <a:cxnSpLocks/>
+            <a:stCxn id="83" idx="3"/>
+            <a:endCxn id="56" idx="2"/>
+          </p:cNvCxnSpPr>
+          <p:nvPr/>
+        </p:nvCxnSpPr>
+        <p:spPr>
+          <a:xfrm flipV="1">
+            <a:off x="7681718" y="2036690"/>
+            <a:ext cx="425711" cy="1316396"/>
+          </a:xfrm>
+          <a:prstGeom prst="bentConnector2">
+            <a:avLst/>
+          </a:prstGeom>
+          <a:ln w="19050">
+            <a:solidFill>
+              <a:srgbClr val="7030A0"/>
+            </a:solidFill>
+            <a:prstDash val="solid"/>
+            <a:headEnd type="none" w="med" len="med"/>
+            <a:tailEnd type="triangle" w="med" len="med"/>
+          </a:ln>
+          <a:effectLst/>
+        </p:spPr>
+        <p:style>
+          <a:lnRef idx="1">
+            <a:schemeClr val="accent2"/>
+          </a:lnRef>
+          <a:fillRef idx="2">
+            <a:schemeClr val="accent2"/>
+          </a:fillRef>
+          <a:effectRef idx="1">
+            <a:schemeClr val="accent2"/>
+          </a:effectRef>
+          <a:fontRef idx="minor">
+            <a:schemeClr val="dk1"/>
+          </a:fontRef>
+        </p:style>
+      </p:cxnSp>
+      <p:cxnSp>
+        <p:nvCxnSpPr>
+          <p:cNvPr id="74" name="Elbow Connector 106">
+            <a:extLst>
+              <a:ext uri="{FF2B5EF4-FFF2-40B4-BE49-F238E27FC236}">
+                <a16:creationId xmlns:a16="http://schemas.microsoft.com/office/drawing/2014/main" id="{4216EDB4-D77D-4B3D-A69B-CB5669B42D79}"/>
+              </a:ext>
+            </a:extLst>
+          </p:cNvPr>
+          <p:cNvCxnSpPr>
+            <a:cxnSpLocks/>
+            <a:stCxn id="85" idx="3"/>
+            <a:endCxn id="56" idx="2"/>
+          </p:cNvCxnSpPr>
+          <p:nvPr/>
+        </p:nvCxnSpPr>
+        <p:spPr>
+          <a:xfrm flipV="1">
+            <a:off x="7681718" y="2036690"/>
+            <a:ext cx="425711" cy="1639373"/>
+          </a:xfrm>
+          <a:prstGeom prst="bentConnector2">
+            <a:avLst/>
+          </a:prstGeom>
+          <a:ln w="19050">
+            <a:solidFill>
+              <a:srgbClr val="7030A0"/>
+            </a:solidFill>
+            <a:prstDash val="solid"/>
+            <a:headEnd type="none" w="med" len="med"/>
+            <a:tailEnd type="triangle" w="med" len="med"/>
+          </a:ln>
+          <a:effectLst/>
+        </p:spPr>
+        <p:style>
+          <a:lnRef idx="1">
+            <a:schemeClr val="accent2"/>
+          </a:lnRef>
+          <a:fillRef idx="2">
+            <a:schemeClr val="accent2"/>
+          </a:fillRef>
+          <a:effectRef idx="1">
+            <a:schemeClr val="accent2"/>
+          </a:effectRef>
+          <a:fontRef idx="minor">
+            <a:schemeClr val="dk1"/>
+          </a:fontRef>
+        </p:style>
+      </p:cxnSp>
+      <p:sp>
+        <p:nvSpPr>
+          <p:cNvPr id="67" name="Isosceles Triangle 102">
+            <a:extLst>
+              <a:ext uri="{FF2B5EF4-FFF2-40B4-BE49-F238E27FC236}">
+                <a16:creationId xmlns:a16="http://schemas.microsoft.com/office/drawing/2014/main" id="{1FF4CB8B-8CEC-447C-9C68-562E5B836F78}"/>
+              </a:ext>
+            </a:extLst>
+          </p:cNvPr>
+          <p:cNvSpPr/>
+          <p:nvPr/>
+        </p:nvSpPr>
+        <p:spPr>
+          <a:xfrm>
+            <a:off x="7972177" y="2060773"/>
+            <a:ext cx="270504" cy="175523"/>
+          </a:xfrm>
+          <a:prstGeom prst="triangle">
+            <a:avLst/>
+          </a:prstGeom>
+          <a:solidFill>
+            <a:srgbClr val="7030A0"/>
+          </a:solidFill>
+          <a:ln w="19050">
+            <a:solidFill>
+              <a:srgbClr val="7030A0"/>
+            </a:solidFill>
+          </a:ln>
+          <a:effectLst/>
+        </p:spPr>
+        <p:style>
+          <a:lnRef idx="1">
+            <a:schemeClr val="accent6"/>
+          </a:lnRef>
+          <a:fillRef idx="2">
+            <a:schemeClr val="accent6"/>
+          </a:fillRef>
+          <a:effectRef idx="1">
+            <a:schemeClr val="accent6"/>
+          </a:effectRef>
+          <a:fontRef idx="minor">
+            <a:schemeClr val="dk1"/>
+          </a:fontRef>
+        </p:style>
+        <p:txBody>
+          <a:bodyPr rtlCol="0" anchor="ctr"/>
+          <a:lstStyle/>
+          <a:p>
+            <a:pPr algn="ctr"/>
+            <a:endParaRPr lang="en-SG" sz="1050"/>
+          </a:p>
+        </p:txBody>
+      </p:sp>
     </p:spTree>
     <p:extLst>
       <p:ext uri="{BB962C8B-B14F-4D97-AF65-F5344CB8AC3E}">

</xml_diff>

<commit_message>
Extract common functionality between UniqueLoanList and UniqueBikeList (#123)
* Add UniqueListItem.java

* Add UniqueList.java

* Make Bike class implement UniqueListItem

* Make Loan class implement UniqueListItem

* Make UniqueBikeList extend UniqueList

* Make UniqueLoanList inherit from UniqueList

* Update Model class diagram

* Remove trailing whitespace

* UniqueList rename set() to setAll() to prevent overloading

* Correct javadoc style
</commit_message>
<xml_diff>
--- a/docs/diagrams/ModelComponentClassDiagram.pptx
+++ b/docs/diagrams/ModelComponentClassDiagram.pptx
@@ -208,7 +208,7 @@
           <a:p>
             <a:fld id="{F5CC4B3F-88C1-4FFA-B1B6-F41C21DC6924}" type="datetimeFigureOut">
               <a:rPr lang="en-US" smtClean="0"/>
-              <a:t>10/21/2018</a:t>
+              <a:t>10/22/2018</a:t>
             </a:fld>
             <a:endParaRPr lang="en-US"/>
           </a:p>
@@ -654,7 +654,7 @@
           <a:p>
             <a:fld id="{78C97017-6FC3-485B-9764-EAC9E56C1D49}" type="datetimeFigureOut">
               <a:rPr lang="en-US" smtClean="0"/>
-              <a:t>10/21/2018</a:t>
+              <a:t>10/22/2018</a:t>
             </a:fld>
             <a:endParaRPr lang="en-US"/>
           </a:p>
@@ -822,7 +822,7 @@
           <a:p>
             <a:fld id="{78C97017-6FC3-485B-9764-EAC9E56C1D49}" type="datetimeFigureOut">
               <a:rPr lang="en-US" smtClean="0"/>
-              <a:t>10/21/2018</a:t>
+              <a:t>10/22/2018</a:t>
             </a:fld>
             <a:endParaRPr lang="en-US"/>
           </a:p>
@@ -1000,7 +1000,7 @@
           <a:p>
             <a:fld id="{78C97017-6FC3-485B-9764-EAC9E56C1D49}" type="datetimeFigureOut">
               <a:rPr lang="en-US" smtClean="0"/>
-              <a:t>10/21/2018</a:t>
+              <a:t>10/22/2018</a:t>
             </a:fld>
             <a:endParaRPr lang="en-US"/>
           </a:p>
@@ -1168,7 +1168,7 @@
           <a:p>
             <a:fld id="{78C97017-6FC3-485B-9764-EAC9E56C1D49}" type="datetimeFigureOut">
               <a:rPr lang="en-US" smtClean="0"/>
-              <a:t>10/21/2018</a:t>
+              <a:t>10/22/2018</a:t>
             </a:fld>
             <a:endParaRPr lang="en-US"/>
           </a:p>
@@ -1413,7 +1413,7 @@
           <a:p>
             <a:fld id="{78C97017-6FC3-485B-9764-EAC9E56C1D49}" type="datetimeFigureOut">
               <a:rPr lang="en-US" smtClean="0"/>
-              <a:t>10/21/2018</a:t>
+              <a:t>10/22/2018</a:t>
             </a:fld>
             <a:endParaRPr lang="en-US"/>
           </a:p>
@@ -1698,7 +1698,7 @@
           <a:p>
             <a:fld id="{78C97017-6FC3-485B-9764-EAC9E56C1D49}" type="datetimeFigureOut">
               <a:rPr lang="en-US" smtClean="0"/>
-              <a:t>10/21/2018</a:t>
+              <a:t>10/22/2018</a:t>
             </a:fld>
             <a:endParaRPr lang="en-US"/>
           </a:p>
@@ -2117,7 +2117,7 @@
           <a:p>
             <a:fld id="{78C97017-6FC3-485B-9764-EAC9E56C1D49}" type="datetimeFigureOut">
               <a:rPr lang="en-US" smtClean="0"/>
-              <a:t>10/21/2018</a:t>
+              <a:t>10/22/2018</a:t>
             </a:fld>
             <a:endParaRPr lang="en-US"/>
           </a:p>
@@ -2234,7 +2234,7 @@
           <a:p>
             <a:fld id="{78C97017-6FC3-485B-9764-EAC9E56C1D49}" type="datetimeFigureOut">
               <a:rPr lang="en-US" smtClean="0"/>
-              <a:t>10/21/2018</a:t>
+              <a:t>10/22/2018</a:t>
             </a:fld>
             <a:endParaRPr lang="en-US"/>
           </a:p>
@@ -2329,7 +2329,7 @@
           <a:p>
             <a:fld id="{78C97017-6FC3-485B-9764-EAC9E56C1D49}" type="datetimeFigureOut">
               <a:rPr lang="en-US" smtClean="0"/>
-              <a:t>10/21/2018</a:t>
+              <a:t>10/22/2018</a:t>
             </a:fld>
             <a:endParaRPr lang="en-US"/>
           </a:p>
@@ -2604,7 +2604,7 @@
           <a:p>
             <a:fld id="{78C97017-6FC3-485B-9764-EAC9E56C1D49}" type="datetimeFigureOut">
               <a:rPr lang="en-US" smtClean="0"/>
-              <a:t>10/21/2018</a:t>
+              <a:t>10/22/2018</a:t>
             </a:fld>
             <a:endParaRPr lang="en-US"/>
           </a:p>
@@ -2856,7 +2856,7 @@
           <a:p>
             <a:fld id="{78C97017-6FC3-485B-9764-EAC9E56C1D49}" type="datetimeFigureOut">
               <a:rPr lang="en-US" smtClean="0"/>
-              <a:t>10/21/2018</a:t>
+              <a:t>10/22/2018</a:t>
             </a:fld>
             <a:endParaRPr lang="en-US"/>
           </a:p>
@@ -3067,7 +3067,7 @@
           <a:p>
             <a:fld id="{78C97017-6FC3-485B-9764-EAC9E56C1D49}" type="datetimeFigureOut">
               <a:rPr lang="en-US" smtClean="0"/>
-              <a:t>10/21/2018</a:t>
+              <a:t>10/22/2018</a:t>
             </a:fld>
             <a:endParaRPr lang="en-US"/>
           </a:p>
@@ -3450,7 +3450,7 @@
         </p:nvSpPr>
         <p:spPr>
           <a:xfrm>
-            <a:off x="381000" y="1339853"/>
+            <a:off x="381000" y="1367856"/>
             <a:ext cx="8458200" cy="3610286"/>
           </a:xfrm>
           <a:prstGeom prst="roundRect">
@@ -4263,7 +4263,7 @@
         </p:nvSpPr>
         <p:spPr>
           <a:xfrm>
-            <a:off x="5277999" y="3645585"/>
+            <a:off x="5277247" y="3646422"/>
             <a:ext cx="236048" cy="173380"/>
           </a:xfrm>
           <a:prstGeom prst="flowChartDecision">
@@ -4311,8 +4311,8 @@
         </p:nvCxnSpPr>
         <p:spPr>
           <a:xfrm>
-            <a:off x="5514047" y="3732275"/>
-            <a:ext cx="192738" cy="837"/>
+            <a:off x="5513295" y="3733112"/>
+            <a:ext cx="193490" cy="12700"/>
           </a:xfrm>
           <a:prstGeom prst="bentConnector3">
             <a:avLst/>
@@ -4405,7 +4405,7 @@
         </p:nvSpPr>
         <p:spPr>
           <a:xfrm>
-            <a:off x="6422212" y="3636790"/>
+            <a:off x="6426701" y="3582810"/>
             <a:ext cx="236048" cy="173380"/>
           </a:xfrm>
           <a:prstGeom prst="flowChartDecision">
@@ -4456,8 +4456,8 @@
         </p:nvCxnSpPr>
         <p:spPr>
           <a:xfrm flipV="1">
-            <a:off x="6658260" y="2707130"/>
-            <a:ext cx="315272" cy="1016350"/>
+            <a:off x="6662749" y="2707130"/>
+            <a:ext cx="310783" cy="962370"/>
           </a:xfrm>
           <a:prstGeom prst="bentConnector3">
             <a:avLst>
@@ -4556,8 +4556,8 @@
         </p:nvCxnSpPr>
         <p:spPr>
           <a:xfrm flipV="1">
-            <a:off x="6658260" y="3030108"/>
-            <a:ext cx="315272" cy="693372"/>
+            <a:off x="6662749" y="3030108"/>
+            <a:ext cx="310783" cy="639392"/>
           </a:xfrm>
           <a:prstGeom prst="bentConnector3">
             <a:avLst/>
@@ -4654,8 +4654,8 @@
         </p:nvCxnSpPr>
         <p:spPr>
           <a:xfrm flipV="1">
-            <a:off x="6658260" y="3353086"/>
-            <a:ext cx="315272" cy="370394"/>
+            <a:off x="6662749" y="3353086"/>
+            <a:ext cx="310783" cy="316414"/>
           </a:xfrm>
           <a:prstGeom prst="bentConnector3">
             <a:avLst/>
@@ -4751,9 +4751,9 @@
           <p:nvPr/>
         </p:nvCxnSpPr>
         <p:spPr>
-          <a:xfrm flipV="1">
-            <a:off x="6658260" y="3676063"/>
-            <a:ext cx="315272" cy="47417"/>
+          <a:xfrm>
+            <a:off x="6662749" y="3669500"/>
+            <a:ext cx="310783" cy="6563"/>
           </a:xfrm>
           <a:prstGeom prst="bentConnector3">
             <a:avLst/>
@@ -4786,16 +4786,14 @@
         <p:nvCxnSpPr>
           <p:cNvPr id="97" name="Elbow Connector 63"/>
           <p:cNvCxnSpPr>
-            <a:cxnSpLocks/>
             <a:stCxn id="99" idx="3"/>
-            <a:endCxn id="46" idx="0"/>
           </p:cNvCxnSpPr>
           <p:nvPr/>
         </p:nvCxnSpPr>
         <p:spPr>
           <a:xfrm rot="5400000">
-            <a:off x="2692500" y="2664187"/>
-            <a:ext cx="321170" cy="42780"/>
+            <a:off x="2814746" y="2687559"/>
+            <a:ext cx="293825" cy="5938"/>
           </a:xfrm>
           <a:prstGeom prst="bentConnector3">
             <a:avLst>
@@ -4835,7 +4833,7 @@
         </p:nvSpPr>
         <p:spPr>
           <a:xfrm rot="10800000" flipV="1">
-            <a:off x="2733282" y="2367930"/>
+            <a:off x="2823434" y="2386554"/>
             <a:ext cx="282387" cy="157062"/>
           </a:xfrm>
           <a:prstGeom prst="triangle">
@@ -4954,7 +4952,7 @@
         </p:nvSpPr>
         <p:spPr>
           <a:xfrm>
-            <a:off x="5189346" y="3288380"/>
+            <a:off x="6006628" y="3266744"/>
             <a:ext cx="881018" cy="261610"/>
           </a:xfrm>
           <a:prstGeom prst="rect">
@@ -5375,8 +5373,8 @@
         </p:nvCxnSpPr>
         <p:spPr>
           <a:xfrm flipV="1">
-            <a:off x="6658260" y="2371709"/>
-            <a:ext cx="315272" cy="1351771"/>
+            <a:off x="6662749" y="2371709"/>
+            <a:ext cx="310783" cy="1297791"/>
           </a:xfrm>
           <a:prstGeom prst="bentConnector3">
             <a:avLst>
@@ -5460,8 +5458,8 @@
         </p:nvSpPr>
         <p:spPr>
           <a:xfrm>
-            <a:off x="2431317" y="1998350"/>
-            <a:ext cx="897996" cy="364396"/>
+            <a:off x="2431316" y="1998350"/>
+            <a:ext cx="1060683" cy="364396"/>
           </a:xfrm>
           <a:prstGeom prst="rect">
             <a:avLst/>
@@ -5608,7 +5606,6 @@
         <p:nvCxnSpPr>
           <p:cNvPr id="69" name="Elbow Connector 63"/>
           <p:cNvCxnSpPr>
-            <a:cxnSpLocks/>
             <a:stCxn id="68" idx="3"/>
             <a:endCxn id="55" idx="1"/>
           </p:cNvCxnSpPr>
@@ -5617,7 +5614,7 @@
         <p:spPr>
           <a:xfrm>
             <a:off x="2159424" y="2177727"/>
-            <a:ext cx="271893" cy="2821"/>
+            <a:ext cx="271892" cy="2821"/>
           </a:xfrm>
           <a:prstGeom prst="bentConnector3">
             <a:avLst>
@@ -6371,8 +6368,8 @@
         </p:nvCxnSpPr>
         <p:spPr>
           <a:xfrm>
-            <a:off x="6658260" y="3723480"/>
-            <a:ext cx="315272" cy="269154"/>
+            <a:off x="6662749" y="3669500"/>
+            <a:ext cx="310783" cy="323134"/>
           </a:xfrm>
           <a:prstGeom prst="bentConnector3">
             <a:avLst>
@@ -6421,8 +6418,8 @@
         </p:nvCxnSpPr>
         <p:spPr>
           <a:xfrm>
-            <a:off x="6658260" y="3723480"/>
-            <a:ext cx="315272" cy="592132"/>
+            <a:off x="6662749" y="3669500"/>
+            <a:ext cx="310783" cy="646112"/>
           </a:xfrm>
           <a:prstGeom prst="bentConnector3">
             <a:avLst>
@@ -6471,8 +6468,8 @@
         </p:nvCxnSpPr>
         <p:spPr>
           <a:xfrm>
-            <a:off x="6658260" y="3723480"/>
-            <a:ext cx="315272" cy="915109"/>
+            <a:off x="6662749" y="3669500"/>
+            <a:ext cx="310783" cy="969089"/>
           </a:xfrm>
           <a:prstGeom prst="bentConnector3">
             <a:avLst>
@@ -6690,7 +6687,7 @@
         </p:nvSpPr>
         <p:spPr>
           <a:xfrm>
-            <a:off x="5258913" y="2772245"/>
+            <a:off x="5251979" y="2756715"/>
             <a:ext cx="236048" cy="173380"/>
           </a:xfrm>
           <a:prstGeom prst="flowChartDecision">
@@ -6741,7 +6738,7 @@
         </p:nvSpPr>
         <p:spPr>
           <a:xfrm>
-            <a:off x="5184426" y="3028693"/>
+            <a:off x="6016426" y="3036658"/>
             <a:ext cx="881018" cy="261610"/>
           </a:xfrm>
           <a:prstGeom prst="rect">
@@ -6973,9 +6970,9 @@
           <p:nvPr/>
         </p:nvCxnSpPr>
         <p:spPr>
-          <a:xfrm flipV="1">
-            <a:off x="5494961" y="2854538"/>
-            <a:ext cx="211824" cy="4397"/>
+          <a:xfrm>
+            <a:off x="5488027" y="2843405"/>
+            <a:ext cx="218758" cy="11133"/>
           </a:xfrm>
           <a:prstGeom prst="bentConnector3">
             <a:avLst>
@@ -7073,8 +7070,8 @@
         </p:nvSpPr>
         <p:spPr>
           <a:xfrm>
-            <a:off x="6164978" y="1877260"/>
-            <a:ext cx="722668" cy="285783"/>
+            <a:off x="6363624" y="1877260"/>
+            <a:ext cx="524021" cy="285783"/>
           </a:xfrm>
           <a:prstGeom prst="rect">
             <a:avLst/>
@@ -7139,12 +7136,12 @@
         </p:nvCxnSpPr>
         <p:spPr>
           <a:xfrm rot="5400000" flipH="1" flipV="1">
-            <a:off x="6158268" y="2063915"/>
-            <a:ext cx="268915" cy="467173"/>
+            <a:off x="6207930" y="2014253"/>
+            <a:ext cx="268915" cy="566496"/>
           </a:xfrm>
           <a:prstGeom prst="bentConnector3">
             <a:avLst>
-              <a:gd name="adj1" fmla="val 35832"/>
+              <a:gd name="adj1" fmla="val 50000"/>
             </a:avLst>
           </a:prstGeom>
           <a:ln w="19050">
@@ -7189,8 +7186,8 @@
         </p:nvCxnSpPr>
         <p:spPr>
           <a:xfrm rot="5400000" flipH="1" flipV="1">
-            <a:off x="7036324" y="1305546"/>
-            <a:ext cx="61702" cy="1081726"/>
+            <a:off x="7085985" y="1355208"/>
+            <a:ext cx="61702" cy="982403"/>
           </a:xfrm>
           <a:prstGeom prst="bentConnector2">
             <a:avLst/>
@@ -7273,6 +7270,514 @@
           </a:p>
         </p:txBody>
       </p:sp>
+      <p:sp>
+        <p:nvSpPr>
+          <p:cNvPr id="92" name="Rectangle 8">
+            <a:extLst>
+              <a:ext uri="{FF2B5EF4-FFF2-40B4-BE49-F238E27FC236}">
+                <a16:creationId xmlns:a16="http://schemas.microsoft.com/office/drawing/2014/main" id="{9FAFC4EC-F7C4-4A87-AE1A-F06695D2C825}"/>
+              </a:ext>
+            </a:extLst>
+          </p:cNvPr>
+          <p:cNvSpPr/>
+          <p:nvPr/>
+        </p:nvSpPr>
+        <p:spPr>
+          <a:xfrm>
+            <a:off x="3473948" y="4297712"/>
+            <a:ext cx="797803" cy="442264"/>
+          </a:xfrm>
+          <a:prstGeom prst="rect">
+            <a:avLst/>
+          </a:prstGeom>
+          <a:ln w="19050">
+            <a:solidFill>
+              <a:srgbClr val="7030A0"/>
+            </a:solidFill>
+          </a:ln>
+          <a:effectLst/>
+        </p:spPr>
+        <p:style>
+          <a:lnRef idx="1">
+            <a:schemeClr val="accent4"/>
+          </a:lnRef>
+          <a:fillRef idx="2">
+            <a:schemeClr val="accent4"/>
+          </a:fillRef>
+          <a:effectRef idx="1">
+            <a:schemeClr val="accent4"/>
+          </a:effectRef>
+          <a:fontRef idx="minor">
+            <a:schemeClr val="dk1"/>
+          </a:fontRef>
+        </p:style>
+        <p:txBody>
+          <a:bodyPr rtlCol="0" anchor="ctr"/>
+          <a:lstStyle/>
+          <a:p>
+            <a:pPr algn="ctr"/>
+            <a:r>
+              <a:rPr lang="en-US" sz="1050" dirty="0">
+                <a:solidFill>
+                  <a:srgbClr val="7030A0"/>
+                </a:solidFill>
+              </a:rPr>
+              <a:t>{abstract}</a:t>
+            </a:r>
+          </a:p>
+          <a:p>
+            <a:pPr algn="ctr"/>
+            <a:r>
+              <a:rPr lang="en-US" sz="1050" dirty="0" err="1">
+                <a:solidFill>
+                  <a:srgbClr val="7030A0"/>
+                </a:solidFill>
+              </a:rPr>
+              <a:t>UniqueList</a:t>
+            </a:r>
+            <a:endParaRPr lang="en-US" sz="1050" dirty="0">
+              <a:solidFill>
+                <a:srgbClr val="7030A0"/>
+              </a:solidFill>
+            </a:endParaRPr>
+          </a:p>
+        </p:txBody>
+      </p:sp>
+      <p:sp>
+        <p:nvSpPr>
+          <p:cNvPr id="93" name="Isosceles Triangle 102">
+            <a:extLst>
+              <a:ext uri="{FF2B5EF4-FFF2-40B4-BE49-F238E27FC236}">
+                <a16:creationId xmlns:a16="http://schemas.microsoft.com/office/drawing/2014/main" id="{F7D0CA35-4414-49F4-A21B-8633FFFB4BB7}"/>
+              </a:ext>
+            </a:extLst>
+          </p:cNvPr>
+          <p:cNvSpPr/>
+          <p:nvPr/>
+        </p:nvSpPr>
+        <p:spPr>
+          <a:xfrm rot="10800000">
+            <a:off x="3739804" y="4116305"/>
+            <a:ext cx="270504" cy="175523"/>
+          </a:xfrm>
+          <a:prstGeom prst="triangle">
+            <a:avLst/>
+          </a:prstGeom>
+          <a:solidFill>
+            <a:srgbClr val="7030A0"/>
+          </a:solidFill>
+          <a:ln w="19050">
+            <a:solidFill>
+              <a:srgbClr val="7030A0"/>
+            </a:solidFill>
+          </a:ln>
+          <a:effectLst/>
+        </p:spPr>
+        <p:style>
+          <a:lnRef idx="1">
+            <a:schemeClr val="accent6"/>
+          </a:lnRef>
+          <a:fillRef idx="2">
+            <a:schemeClr val="accent6"/>
+          </a:fillRef>
+          <a:effectRef idx="1">
+            <a:schemeClr val="accent6"/>
+          </a:effectRef>
+          <a:fontRef idx="minor">
+            <a:schemeClr val="dk1"/>
+          </a:fontRef>
+        </p:style>
+        <p:txBody>
+          <a:bodyPr rtlCol="0" anchor="ctr"/>
+          <a:lstStyle/>
+          <a:p>
+            <a:pPr algn="ctr"/>
+            <a:endParaRPr lang="en-SG" sz="1050"/>
+          </a:p>
+        </p:txBody>
+      </p:sp>
+      <p:sp>
+        <p:nvSpPr>
+          <p:cNvPr id="94" name="Rectangle 8">
+            <a:extLst>
+              <a:ext uri="{FF2B5EF4-FFF2-40B4-BE49-F238E27FC236}">
+                <a16:creationId xmlns:a16="http://schemas.microsoft.com/office/drawing/2014/main" id="{EF8876E1-E3D1-4911-B3DB-05EDBAF5442A}"/>
+              </a:ext>
+            </a:extLst>
+          </p:cNvPr>
+          <p:cNvSpPr/>
+          <p:nvPr/>
+        </p:nvSpPr>
+        <p:spPr>
+          <a:xfrm>
+            <a:off x="4911376" y="4326404"/>
+            <a:ext cx="1008734" cy="346760"/>
+          </a:xfrm>
+          <a:prstGeom prst="rect">
+            <a:avLst/>
+          </a:prstGeom>
+          <a:ln w="19050">
+            <a:solidFill>
+              <a:srgbClr val="7030A0"/>
+            </a:solidFill>
+          </a:ln>
+          <a:effectLst/>
+        </p:spPr>
+        <p:style>
+          <a:lnRef idx="1">
+            <a:schemeClr val="accent4"/>
+          </a:lnRef>
+          <a:fillRef idx="2">
+            <a:schemeClr val="accent4"/>
+          </a:fillRef>
+          <a:effectRef idx="1">
+            <a:schemeClr val="accent4"/>
+          </a:effectRef>
+          <a:fontRef idx="minor">
+            <a:schemeClr val="dk1"/>
+          </a:fontRef>
+        </p:style>
+        <p:txBody>
+          <a:bodyPr rtlCol="0" anchor="ctr"/>
+          <a:lstStyle/>
+          <a:p>
+            <a:pPr algn="ctr"/>
+            <a:r>
+              <a:rPr lang="en-US" sz="1050" dirty="0">
+                <a:solidFill>
+                  <a:srgbClr val="7030A0"/>
+                </a:solidFill>
+              </a:rPr>
+              <a:t>&lt;&lt;interface&gt;&gt;</a:t>
+            </a:r>
+            <a:br>
+              <a:rPr lang="en-US" sz="1050" dirty="0">
+                <a:solidFill>
+                  <a:srgbClr val="7030A0"/>
+                </a:solidFill>
+              </a:rPr>
+            </a:br>
+            <a:r>
+              <a:rPr lang="en-US" sz="1050" dirty="0" err="1">
+                <a:solidFill>
+                  <a:srgbClr val="7030A0"/>
+                </a:solidFill>
+              </a:rPr>
+              <a:t>UniqueListItem</a:t>
+            </a:r>
+            <a:endParaRPr lang="en-SG" sz="1050" dirty="0">
+              <a:solidFill>
+                <a:srgbClr val="7030A0"/>
+              </a:solidFill>
+            </a:endParaRPr>
+          </a:p>
+        </p:txBody>
+      </p:sp>
+      <p:cxnSp>
+        <p:nvCxnSpPr>
+          <p:cNvPr id="95" name="Elbow Connector 106">
+            <a:extLst>
+              <a:ext uri="{FF2B5EF4-FFF2-40B4-BE49-F238E27FC236}">
+                <a16:creationId xmlns:a16="http://schemas.microsoft.com/office/drawing/2014/main" id="{F54E8C7B-4D38-41B3-B1C1-7F17E384D2BD}"/>
+              </a:ext>
+            </a:extLst>
+          </p:cNvPr>
+          <p:cNvCxnSpPr>
+            <a:cxnSpLocks/>
+            <a:endCxn id="93" idx="3"/>
+          </p:cNvCxnSpPr>
+          <p:nvPr/>
+        </p:nvCxnSpPr>
+        <p:spPr>
+          <a:xfrm rot="5400000">
+            <a:off x="3424631" y="3453459"/>
+            <a:ext cx="1113272" cy="212421"/>
+          </a:xfrm>
+          <a:prstGeom prst="bentConnector3">
+            <a:avLst>
+              <a:gd name="adj1" fmla="val -5442"/>
+            </a:avLst>
+          </a:prstGeom>
+          <a:ln w="19050">
+            <a:solidFill>
+              <a:srgbClr val="7030A0"/>
+            </a:solidFill>
+            <a:prstDash val="solid"/>
+            <a:headEnd type="none" w="med" len="med"/>
+            <a:tailEnd type="none" w="med" len="med"/>
+          </a:ln>
+          <a:effectLst/>
+        </p:spPr>
+        <p:style>
+          <a:lnRef idx="1">
+            <a:schemeClr val="accent2"/>
+          </a:lnRef>
+          <a:fillRef idx="2">
+            <a:schemeClr val="accent2"/>
+          </a:fillRef>
+          <a:effectRef idx="1">
+            <a:schemeClr val="accent2"/>
+          </a:effectRef>
+          <a:fontRef idx="minor">
+            <a:schemeClr val="dk1"/>
+          </a:fontRef>
+        </p:style>
+      </p:cxnSp>
+      <p:cxnSp>
+        <p:nvCxnSpPr>
+          <p:cNvPr id="98" name="Elbow Connector 106">
+            <a:extLst>
+              <a:ext uri="{FF2B5EF4-FFF2-40B4-BE49-F238E27FC236}">
+                <a16:creationId xmlns:a16="http://schemas.microsoft.com/office/drawing/2014/main" id="{6B8C2F4C-7BB0-4F19-8516-42CF82F25BDE}"/>
+              </a:ext>
+            </a:extLst>
+          </p:cNvPr>
+          <p:cNvCxnSpPr>
+            <a:cxnSpLocks/>
+            <a:endCxn id="93" idx="3"/>
+          </p:cNvCxnSpPr>
+          <p:nvPr/>
+        </p:nvCxnSpPr>
+        <p:spPr>
+          <a:xfrm rot="5400000">
+            <a:off x="3863106" y="3856574"/>
+            <a:ext cx="271682" cy="247781"/>
+          </a:xfrm>
+          <a:prstGeom prst="bentConnector3">
+            <a:avLst>
+              <a:gd name="adj1" fmla="val -486"/>
+            </a:avLst>
+          </a:prstGeom>
+          <a:ln w="19050">
+            <a:solidFill>
+              <a:srgbClr val="7030A0"/>
+            </a:solidFill>
+            <a:prstDash val="solid"/>
+            <a:headEnd type="none" w="med" len="med"/>
+            <a:tailEnd type="none" w="med" len="med"/>
+          </a:ln>
+          <a:effectLst/>
+        </p:spPr>
+        <p:style>
+          <a:lnRef idx="1">
+            <a:schemeClr val="accent2"/>
+          </a:lnRef>
+          <a:fillRef idx="2">
+            <a:schemeClr val="accent2"/>
+          </a:fillRef>
+          <a:effectRef idx="1">
+            <a:schemeClr val="accent2"/>
+          </a:effectRef>
+          <a:fontRef idx="minor">
+            <a:schemeClr val="dk1"/>
+          </a:fontRef>
+        </p:style>
+      </p:cxnSp>
+      <p:cxnSp>
+        <p:nvCxnSpPr>
+          <p:cNvPr id="109" name="Elbow Connector 122">
+            <a:extLst>
+              <a:ext uri="{FF2B5EF4-FFF2-40B4-BE49-F238E27FC236}">
+                <a16:creationId xmlns:a16="http://schemas.microsoft.com/office/drawing/2014/main" id="{4B5D03A6-B6C4-4C2E-B196-414DAC4AB8D7}"/>
+              </a:ext>
+            </a:extLst>
+          </p:cNvPr>
+          <p:cNvCxnSpPr>
+            <a:cxnSpLocks/>
+            <a:stCxn id="92" idx="3"/>
+            <a:endCxn id="94" idx="1"/>
+          </p:cNvCxnSpPr>
+          <p:nvPr/>
+        </p:nvCxnSpPr>
+        <p:spPr>
+          <a:xfrm flipV="1">
+            <a:off x="4271751" y="4499784"/>
+            <a:ext cx="639625" cy="19060"/>
+          </a:xfrm>
+          <a:prstGeom prst="bentConnector3">
+            <a:avLst>
+              <a:gd name="adj1" fmla="val 50000"/>
+            </a:avLst>
+          </a:prstGeom>
+          <a:ln w="19050">
+            <a:solidFill>
+              <a:srgbClr val="7030A0"/>
+            </a:solidFill>
+            <a:prstDash val="sysDot"/>
+            <a:headEnd type="none" w="med" len="med"/>
+            <a:tailEnd type="arrow" w="med" len="med"/>
+          </a:ln>
+          <a:effectLst/>
+        </p:spPr>
+        <p:style>
+          <a:lnRef idx="1">
+            <a:schemeClr val="accent2"/>
+          </a:lnRef>
+          <a:fillRef idx="2">
+            <a:schemeClr val="accent2"/>
+          </a:fillRef>
+          <a:effectRef idx="1">
+            <a:schemeClr val="accent2"/>
+          </a:effectRef>
+          <a:fontRef idx="minor">
+            <a:schemeClr val="dk1"/>
+          </a:fontRef>
+        </p:style>
+      </p:cxnSp>
+      <p:sp>
+        <p:nvSpPr>
+          <p:cNvPr id="113" name="Isosceles Triangle 102">
+            <a:extLst>
+              <a:ext uri="{FF2B5EF4-FFF2-40B4-BE49-F238E27FC236}">
+                <a16:creationId xmlns:a16="http://schemas.microsoft.com/office/drawing/2014/main" id="{7C5E2AC6-E7DC-4B01-B955-FD66591FADF0}"/>
+              </a:ext>
+            </a:extLst>
+          </p:cNvPr>
+          <p:cNvSpPr/>
+          <p:nvPr/>
+        </p:nvSpPr>
+        <p:spPr>
+          <a:xfrm flipV="1">
+            <a:off x="5391222" y="4169342"/>
+            <a:ext cx="282387" cy="157062"/>
+          </a:xfrm>
+          <a:prstGeom prst="triangle">
+            <a:avLst/>
+          </a:prstGeom>
+          <a:ln w="19050">
+            <a:solidFill>
+              <a:srgbClr val="7030A0"/>
+            </a:solidFill>
+          </a:ln>
+          <a:effectLst/>
+        </p:spPr>
+        <p:style>
+          <a:lnRef idx="1">
+            <a:schemeClr val="accent4"/>
+          </a:lnRef>
+          <a:fillRef idx="2">
+            <a:schemeClr val="accent4"/>
+          </a:fillRef>
+          <a:effectRef idx="1">
+            <a:schemeClr val="accent4"/>
+          </a:effectRef>
+          <a:fontRef idx="minor">
+            <a:schemeClr val="dk1"/>
+          </a:fontRef>
+        </p:style>
+        <p:txBody>
+          <a:bodyPr rtlCol="0" anchor="ctr"/>
+          <a:lstStyle/>
+          <a:p>
+            <a:pPr algn="ctr"/>
+            <a:endParaRPr lang="en-SG" sz="1050" b="1">
+              <a:solidFill>
+                <a:srgbClr val="92D050"/>
+              </a:solidFill>
+            </a:endParaRPr>
+          </a:p>
+        </p:txBody>
+      </p:sp>
+      <p:cxnSp>
+        <p:nvCxnSpPr>
+          <p:cNvPr id="115" name="Elbow Connector 63">
+            <a:extLst>
+              <a:ext uri="{FF2B5EF4-FFF2-40B4-BE49-F238E27FC236}">
+                <a16:creationId xmlns:a16="http://schemas.microsoft.com/office/drawing/2014/main" id="{76C0288F-388A-4546-921E-EA9097F44541}"/>
+              </a:ext>
+            </a:extLst>
+          </p:cNvPr>
+          <p:cNvCxnSpPr>
+            <a:cxnSpLocks/>
+            <a:endCxn id="113" idx="3"/>
+          </p:cNvCxnSpPr>
+          <p:nvPr/>
+        </p:nvCxnSpPr>
+        <p:spPr>
+          <a:xfrm rot="5400000">
+            <a:off x="5028052" y="3490605"/>
+            <a:ext cx="1183101" cy="174372"/>
+          </a:xfrm>
+          <a:prstGeom prst="bentConnector3">
+            <a:avLst>
+              <a:gd name="adj1" fmla="val -238"/>
+            </a:avLst>
+          </a:prstGeom>
+          <a:ln w="19050">
+            <a:solidFill>
+              <a:srgbClr val="7030A0"/>
+            </a:solidFill>
+            <a:prstDash val="sysDot"/>
+            <a:headEnd type="none" w="med" len="med"/>
+            <a:tailEnd type="none" w="med" len="med"/>
+          </a:ln>
+          <a:effectLst/>
+        </p:spPr>
+        <p:style>
+          <a:lnRef idx="1">
+            <a:schemeClr val="accent2"/>
+          </a:lnRef>
+          <a:fillRef idx="2">
+            <a:schemeClr val="accent2"/>
+          </a:fillRef>
+          <a:effectRef idx="1">
+            <a:schemeClr val="accent2"/>
+          </a:effectRef>
+          <a:fontRef idx="minor">
+            <a:schemeClr val="dk1"/>
+          </a:fontRef>
+        </p:style>
+      </p:cxnSp>
+      <p:cxnSp>
+        <p:nvCxnSpPr>
+          <p:cNvPr id="121" name="Elbow Connector 63">
+            <a:extLst>
+              <a:ext uri="{FF2B5EF4-FFF2-40B4-BE49-F238E27FC236}">
+                <a16:creationId xmlns:a16="http://schemas.microsoft.com/office/drawing/2014/main" id="{9CC24216-58E6-4BCC-9FF6-A704D6B90FFF}"/>
+              </a:ext>
+            </a:extLst>
+          </p:cNvPr>
+          <p:cNvCxnSpPr>
+            <a:cxnSpLocks/>
+            <a:endCxn id="113" idx="3"/>
+          </p:cNvCxnSpPr>
+          <p:nvPr/>
+        </p:nvCxnSpPr>
+        <p:spPr>
+          <a:xfrm rot="5400000">
+            <a:off x="5485575" y="3943675"/>
+            <a:ext cx="272509" cy="178825"/>
+          </a:xfrm>
+          <a:prstGeom prst="bentConnector3">
+            <a:avLst>
+              <a:gd name="adj1" fmla="val -5925"/>
+            </a:avLst>
+          </a:prstGeom>
+          <a:ln w="19050">
+            <a:solidFill>
+              <a:srgbClr val="7030A0"/>
+            </a:solidFill>
+            <a:prstDash val="sysDot"/>
+            <a:headEnd type="none" w="med" len="med"/>
+            <a:tailEnd type="none" w="med" len="med"/>
+          </a:ln>
+          <a:effectLst/>
+        </p:spPr>
+        <p:style>
+          <a:lnRef idx="1">
+            <a:schemeClr val="accent2"/>
+          </a:lnRef>
+          <a:fillRef idx="2">
+            <a:schemeClr val="accent2"/>
+          </a:fillRef>
+          <a:effectRef idx="1">
+            <a:schemeClr val="accent2"/>
+          </a:effectRef>
+          <a:fontRef idx="minor">
+            <a:schemeClr val="dk1"/>
+          </a:fontRef>
+        </p:style>
+      </p:cxnSp>
     </p:spTree>
     <p:extLst>
       <p:ext uri="{BB962C8B-B14F-4D97-AF65-F5344CB8AC3E}">

</xml_diff>

<commit_message>
Update UG/DG and PPP (#273)
* Update model class diagram

* Update model component section

* Update dev guide Bicycle Management section

* Remove Bicycle Management class diagram

* Add BicycleManagementAddLoanSequenceDiagram

* Add activity diagrams for BikeStatus

* Update Getting Started section in User Guide

* Rename LOAN_INDEX to LIST_INDEX in User Guide

* Fix nits in Commands section of User Guide

* Fix User Guide command specs
</commit_message>
<xml_diff>
--- a/docs/diagrams/ModelComponentClassDiagram.pptx
+++ b/docs/diagrams/ModelComponentClassDiagram.pptx
@@ -208,7 +208,7 @@
           <a:p>
             <a:fld id="{F5CC4B3F-88C1-4FFA-B1B6-F41C21DC6924}" type="datetimeFigureOut">
               <a:rPr lang="en-US" smtClean="0"/>
-              <a:t>11/1/2018</a:t>
+              <a:t>11/11/2018</a:t>
             </a:fld>
             <a:endParaRPr lang="en-US"/>
           </a:p>
@@ -654,7 +654,7 @@
           <a:p>
             <a:fld id="{78C97017-6FC3-485B-9764-EAC9E56C1D49}" type="datetimeFigureOut">
               <a:rPr lang="en-US" smtClean="0"/>
-              <a:t>11/1/2018</a:t>
+              <a:t>11/11/2018</a:t>
             </a:fld>
             <a:endParaRPr lang="en-US"/>
           </a:p>
@@ -822,7 +822,7 @@
           <a:p>
             <a:fld id="{78C97017-6FC3-485B-9764-EAC9E56C1D49}" type="datetimeFigureOut">
               <a:rPr lang="en-US" smtClean="0"/>
-              <a:t>11/1/2018</a:t>
+              <a:t>11/11/2018</a:t>
             </a:fld>
             <a:endParaRPr lang="en-US"/>
           </a:p>
@@ -1000,7 +1000,7 @@
           <a:p>
             <a:fld id="{78C97017-6FC3-485B-9764-EAC9E56C1D49}" type="datetimeFigureOut">
               <a:rPr lang="en-US" smtClean="0"/>
-              <a:t>11/1/2018</a:t>
+              <a:t>11/11/2018</a:t>
             </a:fld>
             <a:endParaRPr lang="en-US"/>
           </a:p>
@@ -1168,7 +1168,7 @@
           <a:p>
             <a:fld id="{78C97017-6FC3-485B-9764-EAC9E56C1D49}" type="datetimeFigureOut">
               <a:rPr lang="en-US" smtClean="0"/>
-              <a:t>11/1/2018</a:t>
+              <a:t>11/11/2018</a:t>
             </a:fld>
             <a:endParaRPr lang="en-US"/>
           </a:p>
@@ -1413,7 +1413,7 @@
           <a:p>
             <a:fld id="{78C97017-6FC3-485B-9764-EAC9E56C1D49}" type="datetimeFigureOut">
               <a:rPr lang="en-US" smtClean="0"/>
-              <a:t>11/1/2018</a:t>
+              <a:t>11/11/2018</a:t>
             </a:fld>
             <a:endParaRPr lang="en-US"/>
           </a:p>
@@ -1698,7 +1698,7 @@
           <a:p>
             <a:fld id="{78C97017-6FC3-485B-9764-EAC9E56C1D49}" type="datetimeFigureOut">
               <a:rPr lang="en-US" smtClean="0"/>
-              <a:t>11/1/2018</a:t>
+              <a:t>11/11/2018</a:t>
             </a:fld>
             <a:endParaRPr lang="en-US"/>
           </a:p>
@@ -2117,7 +2117,7 @@
           <a:p>
             <a:fld id="{78C97017-6FC3-485B-9764-EAC9E56C1D49}" type="datetimeFigureOut">
               <a:rPr lang="en-US" smtClean="0"/>
-              <a:t>11/1/2018</a:t>
+              <a:t>11/11/2018</a:t>
             </a:fld>
             <a:endParaRPr lang="en-US"/>
           </a:p>
@@ -2234,7 +2234,7 @@
           <a:p>
             <a:fld id="{78C97017-6FC3-485B-9764-EAC9E56C1D49}" type="datetimeFigureOut">
               <a:rPr lang="en-US" smtClean="0"/>
-              <a:t>11/1/2018</a:t>
+              <a:t>11/11/2018</a:t>
             </a:fld>
             <a:endParaRPr lang="en-US"/>
           </a:p>
@@ -2329,7 +2329,7 @@
           <a:p>
             <a:fld id="{78C97017-6FC3-485B-9764-EAC9E56C1D49}" type="datetimeFigureOut">
               <a:rPr lang="en-US" smtClean="0"/>
-              <a:t>11/1/2018</a:t>
+              <a:t>11/11/2018</a:t>
             </a:fld>
             <a:endParaRPr lang="en-US"/>
           </a:p>
@@ -2604,7 +2604,7 @@
           <a:p>
             <a:fld id="{78C97017-6FC3-485B-9764-EAC9E56C1D49}" type="datetimeFigureOut">
               <a:rPr lang="en-US" smtClean="0"/>
-              <a:t>11/1/2018</a:t>
+              <a:t>11/11/2018</a:t>
             </a:fld>
             <a:endParaRPr lang="en-US"/>
           </a:p>
@@ -2856,7 +2856,7 @@
           <a:p>
             <a:fld id="{78C97017-6FC3-485B-9764-EAC9E56C1D49}" type="datetimeFigureOut">
               <a:rPr lang="en-US" smtClean="0"/>
-              <a:t>11/1/2018</a:t>
+              <a:t>11/11/2018</a:t>
             </a:fld>
             <a:endParaRPr lang="en-US"/>
           </a:p>
@@ -3067,7 +3067,7 @@
           <a:p>
             <a:fld id="{78C97017-6FC3-485B-9764-EAC9E56C1D49}" type="datetimeFigureOut">
               <a:rPr lang="en-US" smtClean="0"/>
-              <a:t>11/1/2018</a:t>
+              <a:t>11/11/2018</a:t>
             </a:fld>
             <a:endParaRPr lang="en-US"/>
           </a:p>
@@ -3589,8 +3589,8 @@
         </p:nvSpPr>
         <p:spPr>
           <a:xfrm>
-            <a:off x="5519549" y="3635640"/>
-            <a:ext cx="1539124" cy="1406384"/>
+            <a:off x="5519548" y="3635640"/>
+            <a:ext cx="2934986" cy="1433657"/>
           </a:xfrm>
           <a:prstGeom prst="roundRect">
             <a:avLst>
@@ -7933,7 +7933,7 @@
         </p:nvSpPr>
         <p:spPr>
           <a:xfrm>
-            <a:off x="5836373" y="4594319"/>
+            <a:off x="5594638" y="4594319"/>
             <a:ext cx="714689" cy="295700"/>
           </a:xfrm>
           <a:prstGeom prst="rect">
@@ -7998,9 +7998,9 @@
           <p:nvPr/>
         </p:nvCxnSpPr>
         <p:spPr>
-          <a:xfrm rot="16200000" flipH="1">
-            <a:off x="5995327" y="4395928"/>
-            <a:ext cx="289024" cy="107758"/>
+          <a:xfrm rot="5400000">
+            <a:off x="5874460" y="4382819"/>
+            <a:ext cx="289024" cy="133977"/>
           </a:xfrm>
           <a:prstGeom prst="bentConnector3">
             <a:avLst>
@@ -8049,8 +8049,8 @@
         </p:nvCxnSpPr>
         <p:spPr>
           <a:xfrm rot="16200000" flipH="1">
-            <a:off x="6159504" y="4924232"/>
-            <a:ext cx="1271157" cy="1202729"/>
+            <a:off x="6038637" y="4803365"/>
+            <a:ext cx="1271157" cy="1444464"/>
           </a:xfrm>
           <a:prstGeom prst="bentConnector2">
             <a:avLst/>
@@ -8838,12 +8838,12 @@
         </p:nvCxnSpPr>
         <p:spPr>
           <a:xfrm rot="16200000" flipH="1">
-            <a:off x="3145291" y="3223137"/>
-            <a:ext cx="1473014" cy="503574"/>
+            <a:off x="3219393" y="3297238"/>
+            <a:ext cx="1343399" cy="484985"/>
           </a:xfrm>
           <a:prstGeom prst="bentConnector3">
             <a:avLst>
-              <a:gd name="adj1" fmla="val 88798"/>
+              <a:gd name="adj1" fmla="val 89590"/>
             </a:avLst>
           </a:prstGeom>
           <a:ln w="19050">
@@ -8871,12 +8871,107 @@
           </a:fontRef>
         </p:style>
       </p:cxnSp>
-      <p:sp>
-        <p:nvSpPr>
-          <p:cNvPr id="101" name="Flowchart: Decision 96">
-            <a:extLst>
-              <a:ext uri="{FF2B5EF4-FFF2-40B4-BE49-F238E27FC236}">
-                <a16:creationId xmlns:a16="http://schemas.microsoft.com/office/drawing/2014/main" id="{1DB613A4-D88F-4C09-A760-52CB8F3D334A}"/>
+      <p:cxnSp>
+        <p:nvCxnSpPr>
+          <p:cNvPr id="102" name="Elbow Connector 63">
+            <a:extLst>
+              <a:ext uri="{FF2B5EF4-FFF2-40B4-BE49-F238E27FC236}">
+                <a16:creationId xmlns:a16="http://schemas.microsoft.com/office/drawing/2014/main" id="{744F89C8-F729-4A40-ADF1-497CD98CD99C}"/>
+              </a:ext>
+            </a:extLst>
+          </p:cNvPr>
+          <p:cNvCxnSpPr>
+            <a:cxnSpLocks/>
+            <a:stCxn id="172" idx="3"/>
+            <a:endCxn id="216" idx="1"/>
+          </p:cNvCxnSpPr>
+          <p:nvPr/>
+        </p:nvCxnSpPr>
+        <p:spPr>
+          <a:xfrm flipV="1">
+            <a:off x="5182156" y="3918493"/>
+            <a:ext cx="438704" cy="10633"/>
+          </a:xfrm>
+          <a:prstGeom prst="bentConnector3">
+            <a:avLst>
+              <a:gd name="adj1" fmla="val 50000"/>
+            </a:avLst>
+          </a:prstGeom>
+          <a:ln w="19050">
+            <a:solidFill>
+              <a:srgbClr val="7030A0"/>
+            </a:solidFill>
+            <a:headEnd type="none" w="med" len="med"/>
+            <a:tailEnd type="arrow" w="med" len="med"/>
+          </a:ln>
+          <a:effectLst/>
+        </p:spPr>
+        <p:style>
+          <a:lnRef idx="1">
+            <a:schemeClr val="accent2"/>
+          </a:lnRef>
+          <a:fillRef idx="2">
+            <a:schemeClr val="accent2"/>
+          </a:fillRef>
+          <a:effectRef idx="1">
+            <a:schemeClr val="accent2"/>
+          </a:effectRef>
+          <a:fontRef idx="minor">
+            <a:schemeClr val="dk1"/>
+          </a:fontRef>
+        </p:style>
+      </p:cxnSp>
+      <p:sp>
+        <p:nvSpPr>
+          <p:cNvPr id="105" name="TextBox 104">
+            <a:extLst>
+              <a:ext uri="{FF2B5EF4-FFF2-40B4-BE49-F238E27FC236}">
+                <a16:creationId xmlns:a16="http://schemas.microsoft.com/office/drawing/2014/main" id="{A846C247-5BE8-453B-94A4-F8D56DD4F771}"/>
+              </a:ext>
+            </a:extLst>
+          </p:cNvPr>
+          <p:cNvSpPr txBox="1"/>
+          <p:nvPr/>
+        </p:nvSpPr>
+        <p:spPr>
+          <a:xfrm>
+            <a:off x="5459721" y="3714930"/>
+            <a:ext cx="189257" cy="178683"/>
+          </a:xfrm>
+          <a:prstGeom prst="rect">
+            <a:avLst/>
+          </a:prstGeom>
+          <a:noFill/>
+        </p:spPr>
+        <p:txBody>
+          <a:bodyPr wrap="square" lIns="0" tIns="0" rIns="0" bIns="0" rtlCol="0">
+            <a:noAutofit/>
+          </a:bodyPr>
+          <a:lstStyle/>
+          <a:p>
+            <a:pPr algn="ctr"/>
+            <a:r>
+              <a:rPr lang="en-US" sz="1100" dirty="0">
+                <a:solidFill>
+                  <a:srgbClr val="7030A0"/>
+                </a:solidFill>
+              </a:rPr>
+              <a:t>1</a:t>
+            </a:r>
+            <a:endParaRPr lang="en-SG" sz="1100" dirty="0">
+              <a:solidFill>
+                <a:srgbClr val="7030A0"/>
+              </a:solidFill>
+            </a:endParaRPr>
+          </a:p>
+        </p:txBody>
+      </p:sp>
+      <p:sp>
+        <p:nvSpPr>
+          <p:cNvPr id="119" name="Rectangle 8">
+            <a:extLst>
+              <a:ext uri="{FF2B5EF4-FFF2-40B4-BE49-F238E27FC236}">
+                <a16:creationId xmlns:a16="http://schemas.microsoft.com/office/drawing/2014/main" id="{7C377596-E861-41BA-92F8-FB0DEFB5F5A9}"/>
               </a:ext>
             </a:extLst>
           </p:cNvPr>
@@ -8885,13 +8980,775 @@
         </p:nvSpPr>
         <p:spPr>
           <a:xfrm>
-            <a:off x="5159479" y="3826804"/>
+            <a:off x="3765267" y="4574115"/>
+            <a:ext cx="818980" cy="285783"/>
+          </a:xfrm>
+          <a:prstGeom prst="rect">
+            <a:avLst/>
+          </a:prstGeom>
+          <a:ln w="19050">
+            <a:solidFill>
+              <a:srgbClr val="7030A0"/>
+            </a:solidFill>
+          </a:ln>
+          <a:effectLst/>
+        </p:spPr>
+        <p:style>
+          <a:lnRef idx="1">
+            <a:schemeClr val="accent4"/>
+          </a:lnRef>
+          <a:fillRef idx="2">
+            <a:schemeClr val="accent4"/>
+          </a:fillRef>
+          <a:effectRef idx="1">
+            <a:schemeClr val="accent4"/>
+          </a:effectRef>
+          <a:fontRef idx="minor">
+            <a:schemeClr val="dk1"/>
+          </a:fontRef>
+        </p:style>
+        <p:txBody>
+          <a:bodyPr rtlCol="0" anchor="ctr"/>
+          <a:lstStyle/>
+          <a:p>
+            <a:pPr algn="ctr"/>
+            <a:r>
+              <a:rPr lang="en-US" sz="1050" dirty="0" err="1">
+                <a:solidFill>
+                  <a:srgbClr val="7030A0"/>
+                </a:solidFill>
+              </a:rPr>
+              <a:t>LoanStatus</a:t>
+            </a:r>
+            <a:endParaRPr lang="en-SG" sz="1050" dirty="0">
+              <a:solidFill>
+                <a:srgbClr val="7030A0"/>
+              </a:solidFill>
+            </a:endParaRPr>
+          </a:p>
+        </p:txBody>
+      </p:sp>
+      <p:cxnSp>
+        <p:nvCxnSpPr>
+          <p:cNvPr id="192" name="Elbow Connector 106">
+            <a:extLst>
+              <a:ext uri="{FF2B5EF4-FFF2-40B4-BE49-F238E27FC236}">
+                <a16:creationId xmlns:a16="http://schemas.microsoft.com/office/drawing/2014/main" id="{43BE3477-AF70-411F-A7C8-1BA6322922F2}"/>
+              </a:ext>
+            </a:extLst>
+          </p:cNvPr>
+          <p:cNvCxnSpPr>
+            <a:cxnSpLocks/>
+            <a:stCxn id="119" idx="1"/>
+            <a:endCxn id="190" idx="1"/>
+          </p:cNvCxnSpPr>
+          <p:nvPr/>
+        </p:nvCxnSpPr>
+        <p:spPr>
+          <a:xfrm rot="10800000" flipH="1" flipV="1">
+            <a:off x="3765267" y="4717006"/>
+            <a:ext cx="3631180" cy="1444169"/>
+          </a:xfrm>
+          <a:prstGeom prst="bentConnector3">
+            <a:avLst>
+              <a:gd name="adj1" fmla="val -3357"/>
+            </a:avLst>
+          </a:prstGeom>
+          <a:ln w="19050">
+            <a:solidFill>
+              <a:srgbClr val="7030A0"/>
+            </a:solidFill>
+            <a:prstDash val="solid"/>
+            <a:headEnd type="none" w="med" len="med"/>
+            <a:tailEnd type="triangle" w="med" len="med"/>
+          </a:ln>
+          <a:effectLst/>
+        </p:spPr>
+        <p:style>
+          <a:lnRef idx="1">
+            <a:schemeClr val="accent2"/>
+          </a:lnRef>
+          <a:fillRef idx="2">
+            <a:schemeClr val="accent2"/>
+          </a:fillRef>
+          <a:effectRef idx="1">
+            <a:schemeClr val="accent2"/>
+          </a:effectRef>
+          <a:fontRef idx="minor">
+            <a:schemeClr val="dk1"/>
+          </a:fontRef>
+        </p:style>
+      </p:cxnSp>
+      <p:cxnSp>
+        <p:nvCxnSpPr>
+          <p:cNvPr id="194" name="Elbow Connector 85">
+            <a:extLst>
+              <a:ext uri="{FF2B5EF4-FFF2-40B4-BE49-F238E27FC236}">
+                <a16:creationId xmlns:a16="http://schemas.microsoft.com/office/drawing/2014/main" id="{ABF032A2-D4AE-4AFA-AED2-456F7E127068}"/>
+              </a:ext>
+            </a:extLst>
+          </p:cNvPr>
+          <p:cNvCxnSpPr>
+            <a:cxnSpLocks/>
+            <a:stCxn id="176" idx="3"/>
+            <a:endCxn id="119" idx="3"/>
+          </p:cNvCxnSpPr>
+          <p:nvPr/>
+        </p:nvCxnSpPr>
+        <p:spPr>
+          <a:xfrm rot="5400000">
+            <a:off x="4451137" y="4447228"/>
+            <a:ext cx="402889" cy="136668"/>
+          </a:xfrm>
+          <a:prstGeom prst="bentConnector2">
+            <a:avLst/>
+          </a:prstGeom>
+          <a:ln w="19050">
+            <a:solidFill>
+              <a:srgbClr val="7030A0"/>
+            </a:solidFill>
+            <a:headEnd type="none" w="med" len="med"/>
+            <a:tailEnd type="arrow" w="med" len="med"/>
+          </a:ln>
+          <a:effectLst/>
+        </p:spPr>
+        <p:style>
+          <a:lnRef idx="1">
+            <a:schemeClr val="accent2"/>
+          </a:lnRef>
+          <a:fillRef idx="2">
+            <a:schemeClr val="accent2"/>
+          </a:fillRef>
+          <a:effectRef idx="1">
+            <a:schemeClr val="accent2"/>
+          </a:effectRef>
+          <a:fontRef idx="minor">
+            <a:schemeClr val="dk1"/>
+          </a:fontRef>
+        </p:style>
+      </p:cxnSp>
+      <p:sp>
+        <p:nvSpPr>
+          <p:cNvPr id="111" name="Rectangle 8">
+            <a:extLst>
+              <a:ext uri="{FF2B5EF4-FFF2-40B4-BE49-F238E27FC236}">
+                <a16:creationId xmlns:a16="http://schemas.microsoft.com/office/drawing/2014/main" id="{DE5264E6-5216-413D-BB0C-966C0343ACCB}"/>
+              </a:ext>
+            </a:extLst>
+          </p:cNvPr>
+          <p:cNvSpPr/>
+          <p:nvPr/>
+        </p:nvSpPr>
+        <p:spPr>
+          <a:xfrm>
+            <a:off x="7032934" y="4174870"/>
+            <a:ext cx="1259378" cy="346760"/>
+          </a:xfrm>
+          <a:prstGeom prst="rect">
+            <a:avLst/>
+          </a:prstGeom>
+          <a:ln w="19050">
+            <a:solidFill>
+              <a:srgbClr val="7030A0"/>
+            </a:solidFill>
+          </a:ln>
+          <a:effectLst/>
+        </p:spPr>
+        <p:style>
+          <a:lnRef idx="1">
+            <a:schemeClr val="accent4"/>
+          </a:lnRef>
+          <a:fillRef idx="2">
+            <a:schemeClr val="accent4"/>
+          </a:fillRef>
+          <a:effectRef idx="1">
+            <a:schemeClr val="accent4"/>
+          </a:effectRef>
+          <a:fontRef idx="minor">
+            <a:schemeClr val="dk1"/>
+          </a:fontRef>
+        </p:style>
+        <p:txBody>
+          <a:bodyPr rtlCol="0" anchor="ctr"/>
+          <a:lstStyle/>
+          <a:p>
+            <a:pPr algn="ctr"/>
+            <a:r>
+              <a:rPr lang="en-US" sz="1050" dirty="0">
+                <a:solidFill>
+                  <a:srgbClr val="7030A0"/>
+                </a:solidFill>
+              </a:rPr>
+              <a:t>&lt;&lt;enumeration&gt;&gt;</a:t>
+            </a:r>
+          </a:p>
+          <a:p>
+            <a:pPr algn="ctr"/>
+            <a:r>
+              <a:rPr lang="en-US" sz="1050" dirty="0" err="1">
+                <a:solidFill>
+                  <a:srgbClr val="7030A0"/>
+                </a:solidFill>
+              </a:rPr>
+              <a:t>BikeStatus</a:t>
+            </a:r>
+            <a:endParaRPr lang="en-SG" sz="1050" dirty="0">
+              <a:solidFill>
+                <a:srgbClr val="7030A0"/>
+              </a:solidFill>
+            </a:endParaRPr>
+          </a:p>
+        </p:txBody>
+      </p:sp>
+      <p:cxnSp>
+        <p:nvCxnSpPr>
+          <p:cNvPr id="112" name="Elbow Connector 78">
+            <a:extLst>
+              <a:ext uri="{FF2B5EF4-FFF2-40B4-BE49-F238E27FC236}">
+                <a16:creationId xmlns:a16="http://schemas.microsoft.com/office/drawing/2014/main" id="{2096373F-C461-44DE-A761-B7FBDF254831}"/>
+              </a:ext>
+            </a:extLst>
+          </p:cNvPr>
+          <p:cNvCxnSpPr>
+            <a:cxnSpLocks/>
+            <a:stCxn id="131" idx="3"/>
+            <a:endCxn id="111" idx="0"/>
+          </p:cNvCxnSpPr>
+          <p:nvPr/>
+        </p:nvCxnSpPr>
+        <p:spPr>
+          <a:xfrm>
+            <a:off x="6792239" y="3919921"/>
+            <a:ext cx="870384" cy="254949"/>
+          </a:xfrm>
+          <a:prstGeom prst="bentConnector2">
+            <a:avLst/>
+          </a:prstGeom>
+          <a:ln w="19050">
+            <a:solidFill>
+              <a:srgbClr val="7030A0"/>
+            </a:solidFill>
+            <a:headEnd type="none" w="med" len="med"/>
+            <a:tailEnd type="arrow" w="med" len="med"/>
+          </a:ln>
+          <a:effectLst/>
+        </p:spPr>
+        <p:style>
+          <a:lnRef idx="1">
+            <a:schemeClr val="accent2"/>
+          </a:lnRef>
+          <a:fillRef idx="2">
+            <a:schemeClr val="accent2"/>
+          </a:fillRef>
+          <a:effectRef idx="1">
+            <a:schemeClr val="accent2"/>
+          </a:effectRef>
+          <a:fontRef idx="minor">
+            <a:schemeClr val="dk1"/>
+          </a:fontRef>
+        </p:style>
+      </p:cxnSp>
+      <p:sp>
+        <p:nvSpPr>
+          <p:cNvPr id="121" name="Rectangle 8">
+            <a:extLst>
+              <a:ext uri="{FF2B5EF4-FFF2-40B4-BE49-F238E27FC236}">
+                <a16:creationId xmlns:a16="http://schemas.microsoft.com/office/drawing/2014/main" id="{E1D8FF43-086A-4D08-AADB-69C071BE4C54}"/>
+              </a:ext>
+            </a:extLst>
+          </p:cNvPr>
+          <p:cNvSpPr/>
+          <p:nvPr/>
+        </p:nvSpPr>
+        <p:spPr>
+          <a:xfrm>
+            <a:off x="7036294" y="4532193"/>
+            <a:ext cx="1259378" cy="385040"/>
+          </a:xfrm>
+          <a:prstGeom prst="rect">
+            <a:avLst/>
+          </a:prstGeom>
+          <a:ln w="19050">
+            <a:solidFill>
+              <a:srgbClr val="7030A0"/>
+            </a:solidFill>
+          </a:ln>
+          <a:effectLst/>
+        </p:spPr>
+        <p:style>
+          <a:lnRef idx="1">
+            <a:schemeClr val="accent4"/>
+          </a:lnRef>
+          <a:fillRef idx="2">
+            <a:schemeClr val="accent4"/>
+          </a:fillRef>
+          <a:effectRef idx="1">
+            <a:schemeClr val="accent4"/>
+          </a:effectRef>
+          <a:fontRef idx="minor">
+            <a:schemeClr val="dk1"/>
+          </a:fontRef>
+        </p:style>
+        <p:txBody>
+          <a:bodyPr rtlCol="0" anchor="ctr"/>
+          <a:lstStyle/>
+          <a:p>
+            <a:pPr algn="ctr"/>
+            <a:r>
+              <a:rPr lang="en-US" sz="1050" dirty="0">
+                <a:solidFill>
+                  <a:srgbClr val="7030A0"/>
+                </a:solidFill>
+              </a:rPr>
+              <a:t>AVAILABLE,</a:t>
+            </a:r>
+          </a:p>
+          <a:p>
+            <a:pPr algn="ctr"/>
+            <a:r>
+              <a:rPr lang="en-US" sz="1050" dirty="0">
+                <a:solidFill>
+                  <a:srgbClr val="7030A0"/>
+                </a:solidFill>
+              </a:rPr>
+              <a:t>LOANED_OUT</a:t>
+            </a:r>
+            <a:endParaRPr lang="en-SG" sz="1050" dirty="0">
+              <a:solidFill>
+                <a:srgbClr val="7030A0"/>
+              </a:solidFill>
+            </a:endParaRPr>
+          </a:p>
+        </p:txBody>
+      </p:sp>
+      <p:sp>
+        <p:nvSpPr>
+          <p:cNvPr id="122" name="TextBox 121">
+            <a:extLst>
+              <a:ext uri="{FF2B5EF4-FFF2-40B4-BE49-F238E27FC236}">
+                <a16:creationId xmlns:a16="http://schemas.microsoft.com/office/drawing/2014/main" id="{7245396D-5AF5-4B00-A7AC-5395BAB97E38}"/>
+              </a:ext>
+            </a:extLst>
+          </p:cNvPr>
+          <p:cNvSpPr txBox="1"/>
+          <p:nvPr/>
+        </p:nvSpPr>
+        <p:spPr>
+          <a:xfrm>
+            <a:off x="2535608" y="4318531"/>
+            <a:ext cx="189257" cy="178683"/>
+          </a:xfrm>
+          <a:prstGeom prst="rect">
+            <a:avLst/>
+          </a:prstGeom>
+          <a:noFill/>
+        </p:spPr>
+        <p:txBody>
+          <a:bodyPr wrap="square" lIns="0" tIns="0" rIns="0" bIns="0" rtlCol="0">
+            <a:noAutofit/>
+          </a:bodyPr>
+          <a:lstStyle/>
+          <a:p>
+            <a:pPr algn="ctr"/>
+            <a:r>
+              <a:rPr lang="en-US" sz="1100" dirty="0">
+                <a:solidFill>
+                  <a:srgbClr val="7030A0"/>
+                </a:solidFill>
+              </a:rPr>
+              <a:t>1</a:t>
+            </a:r>
+            <a:endParaRPr lang="en-SG" sz="1100" dirty="0">
+              <a:solidFill>
+                <a:srgbClr val="7030A0"/>
+              </a:solidFill>
+            </a:endParaRPr>
+          </a:p>
+        </p:txBody>
+      </p:sp>
+      <p:sp>
+        <p:nvSpPr>
+          <p:cNvPr id="123" name="TextBox 122">
+            <a:extLst>
+              <a:ext uri="{FF2B5EF4-FFF2-40B4-BE49-F238E27FC236}">
+                <a16:creationId xmlns:a16="http://schemas.microsoft.com/office/drawing/2014/main" id="{C2D77291-D46B-4C9F-884E-D4BDEC44664F}"/>
+              </a:ext>
+            </a:extLst>
+          </p:cNvPr>
+          <p:cNvSpPr txBox="1"/>
+          <p:nvPr/>
+        </p:nvSpPr>
+        <p:spPr>
+          <a:xfrm>
+            <a:off x="2539283" y="4639097"/>
+            <a:ext cx="189257" cy="178683"/>
+          </a:xfrm>
+          <a:prstGeom prst="rect">
+            <a:avLst/>
+          </a:prstGeom>
+          <a:noFill/>
+        </p:spPr>
+        <p:txBody>
+          <a:bodyPr wrap="square" lIns="0" tIns="0" rIns="0" bIns="0" rtlCol="0">
+            <a:noAutofit/>
+          </a:bodyPr>
+          <a:lstStyle/>
+          <a:p>
+            <a:pPr algn="ctr"/>
+            <a:r>
+              <a:rPr lang="en-US" sz="1100" dirty="0">
+                <a:solidFill>
+                  <a:srgbClr val="7030A0"/>
+                </a:solidFill>
+              </a:rPr>
+              <a:t>1</a:t>
+            </a:r>
+            <a:endParaRPr lang="en-SG" sz="1100" dirty="0">
+              <a:solidFill>
+                <a:srgbClr val="7030A0"/>
+              </a:solidFill>
+            </a:endParaRPr>
+          </a:p>
+        </p:txBody>
+      </p:sp>
+      <p:sp>
+        <p:nvSpPr>
+          <p:cNvPr id="124" name="TextBox 123">
+            <a:extLst>
+              <a:ext uri="{FF2B5EF4-FFF2-40B4-BE49-F238E27FC236}">
+                <a16:creationId xmlns:a16="http://schemas.microsoft.com/office/drawing/2014/main" id="{D10F9C31-81DC-471B-B3F9-EF36A8C6BFA8}"/>
+              </a:ext>
+            </a:extLst>
+          </p:cNvPr>
+          <p:cNvSpPr txBox="1"/>
+          <p:nvPr/>
+        </p:nvSpPr>
+        <p:spPr>
+          <a:xfrm>
+            <a:off x="2539283" y="5021786"/>
+            <a:ext cx="189257" cy="178683"/>
+          </a:xfrm>
+          <a:prstGeom prst="rect">
+            <a:avLst/>
+          </a:prstGeom>
+          <a:noFill/>
+        </p:spPr>
+        <p:txBody>
+          <a:bodyPr wrap="square" lIns="0" tIns="0" rIns="0" bIns="0" rtlCol="0">
+            <a:noAutofit/>
+          </a:bodyPr>
+          <a:lstStyle/>
+          <a:p>
+            <a:pPr algn="ctr"/>
+            <a:r>
+              <a:rPr lang="en-US" sz="1100" dirty="0">
+                <a:solidFill>
+                  <a:srgbClr val="7030A0"/>
+                </a:solidFill>
+              </a:rPr>
+              <a:t>1</a:t>
+            </a:r>
+            <a:endParaRPr lang="en-SG" sz="1100" dirty="0">
+              <a:solidFill>
+                <a:srgbClr val="7030A0"/>
+              </a:solidFill>
+            </a:endParaRPr>
+          </a:p>
+        </p:txBody>
+      </p:sp>
+      <p:sp>
+        <p:nvSpPr>
+          <p:cNvPr id="125" name="TextBox 124">
+            <a:extLst>
+              <a:ext uri="{FF2B5EF4-FFF2-40B4-BE49-F238E27FC236}">
+                <a16:creationId xmlns:a16="http://schemas.microsoft.com/office/drawing/2014/main" id="{731B4A54-E321-42DD-96E4-6497C3A72F70}"/>
+              </a:ext>
+            </a:extLst>
+          </p:cNvPr>
+          <p:cNvSpPr txBox="1"/>
+          <p:nvPr/>
+        </p:nvSpPr>
+        <p:spPr>
+          <a:xfrm>
+            <a:off x="2539283" y="5345341"/>
+            <a:ext cx="189257" cy="178683"/>
+          </a:xfrm>
+          <a:prstGeom prst="rect">
+            <a:avLst/>
+          </a:prstGeom>
+          <a:noFill/>
+        </p:spPr>
+        <p:txBody>
+          <a:bodyPr wrap="square" lIns="0" tIns="0" rIns="0" bIns="0" rtlCol="0">
+            <a:noAutofit/>
+          </a:bodyPr>
+          <a:lstStyle/>
+          <a:p>
+            <a:pPr algn="ctr"/>
+            <a:r>
+              <a:rPr lang="en-US" sz="1100" dirty="0">
+                <a:solidFill>
+                  <a:srgbClr val="7030A0"/>
+                </a:solidFill>
+              </a:rPr>
+              <a:t>1</a:t>
+            </a:r>
+            <a:endParaRPr lang="en-SG" sz="1100" dirty="0">
+              <a:solidFill>
+                <a:srgbClr val="7030A0"/>
+              </a:solidFill>
+            </a:endParaRPr>
+          </a:p>
+        </p:txBody>
+      </p:sp>
+      <p:sp>
+        <p:nvSpPr>
+          <p:cNvPr id="126" name="TextBox 125">
+            <a:extLst>
+              <a:ext uri="{FF2B5EF4-FFF2-40B4-BE49-F238E27FC236}">
+                <a16:creationId xmlns:a16="http://schemas.microsoft.com/office/drawing/2014/main" id="{11D3223B-8099-46C5-A3A8-84F59C487ADF}"/>
+              </a:ext>
+            </a:extLst>
+          </p:cNvPr>
+          <p:cNvSpPr txBox="1"/>
+          <p:nvPr/>
+        </p:nvSpPr>
+        <p:spPr>
+          <a:xfrm>
+            <a:off x="4526657" y="4890614"/>
+            <a:ext cx="189257" cy="178683"/>
+          </a:xfrm>
+          <a:prstGeom prst="rect">
+            <a:avLst/>
+          </a:prstGeom>
+          <a:noFill/>
+        </p:spPr>
+        <p:txBody>
+          <a:bodyPr wrap="square" lIns="0" tIns="0" rIns="0" bIns="0" rtlCol="0">
+            <a:noAutofit/>
+          </a:bodyPr>
+          <a:lstStyle/>
+          <a:p>
+            <a:pPr algn="ctr"/>
+            <a:r>
+              <a:rPr lang="en-US" sz="1100" dirty="0">
+                <a:solidFill>
+                  <a:srgbClr val="7030A0"/>
+                </a:solidFill>
+              </a:rPr>
+              <a:t>1</a:t>
+            </a:r>
+            <a:endParaRPr lang="en-SG" sz="1100" dirty="0">
+              <a:solidFill>
+                <a:srgbClr val="7030A0"/>
+              </a:solidFill>
+            </a:endParaRPr>
+          </a:p>
+        </p:txBody>
+      </p:sp>
+      <p:sp>
+        <p:nvSpPr>
+          <p:cNvPr id="127" name="TextBox 126">
+            <a:extLst>
+              <a:ext uri="{FF2B5EF4-FFF2-40B4-BE49-F238E27FC236}">
+                <a16:creationId xmlns:a16="http://schemas.microsoft.com/office/drawing/2014/main" id="{A93A550E-E0C5-4042-A0FE-4F31FF23BC3A}"/>
+              </a:ext>
+            </a:extLst>
+          </p:cNvPr>
+          <p:cNvSpPr txBox="1"/>
+          <p:nvPr/>
+        </p:nvSpPr>
+        <p:spPr>
+          <a:xfrm>
+            <a:off x="4488796" y="4154163"/>
+            <a:ext cx="189257" cy="178683"/>
+          </a:xfrm>
+          <a:prstGeom prst="rect">
+            <a:avLst/>
+          </a:prstGeom>
+          <a:noFill/>
+        </p:spPr>
+        <p:txBody>
+          <a:bodyPr wrap="square" lIns="0" tIns="0" rIns="0" bIns="0" rtlCol="0">
+            <a:noAutofit/>
+          </a:bodyPr>
+          <a:lstStyle/>
+          <a:p>
+            <a:pPr algn="ctr"/>
+            <a:r>
+              <a:rPr lang="en-US" sz="1100" dirty="0">
+                <a:solidFill>
+                  <a:srgbClr val="7030A0"/>
+                </a:solidFill>
+              </a:rPr>
+              <a:t>1</a:t>
+            </a:r>
+            <a:endParaRPr lang="en-SG" sz="1100" dirty="0">
+              <a:solidFill>
+                <a:srgbClr val="7030A0"/>
+              </a:solidFill>
+            </a:endParaRPr>
+          </a:p>
+        </p:txBody>
+      </p:sp>
+      <p:sp>
+        <p:nvSpPr>
+          <p:cNvPr id="128" name="TextBox 127">
+            <a:extLst>
+              <a:ext uri="{FF2B5EF4-FFF2-40B4-BE49-F238E27FC236}">
+                <a16:creationId xmlns:a16="http://schemas.microsoft.com/office/drawing/2014/main" id="{EDC7036B-433A-455E-B6BA-61E21E1B7575}"/>
+              </a:ext>
+            </a:extLst>
+          </p:cNvPr>
+          <p:cNvSpPr txBox="1"/>
+          <p:nvPr/>
+        </p:nvSpPr>
+        <p:spPr>
+          <a:xfrm>
+            <a:off x="4544321" y="4517416"/>
+            <a:ext cx="189257" cy="178683"/>
+          </a:xfrm>
+          <a:prstGeom prst="rect">
+            <a:avLst/>
+          </a:prstGeom>
+          <a:noFill/>
+        </p:spPr>
+        <p:txBody>
+          <a:bodyPr wrap="square" lIns="0" tIns="0" rIns="0" bIns="0" rtlCol="0">
+            <a:noAutofit/>
+          </a:bodyPr>
+          <a:lstStyle/>
+          <a:p>
+            <a:pPr algn="ctr"/>
+            <a:r>
+              <a:rPr lang="en-US" sz="1100" dirty="0">
+                <a:solidFill>
+                  <a:srgbClr val="7030A0"/>
+                </a:solidFill>
+              </a:rPr>
+              <a:t>1</a:t>
+            </a:r>
+            <a:endParaRPr lang="en-SG" sz="1100" dirty="0">
+              <a:solidFill>
+                <a:srgbClr val="7030A0"/>
+              </a:solidFill>
+            </a:endParaRPr>
+          </a:p>
+        </p:txBody>
+      </p:sp>
+      <p:sp>
+        <p:nvSpPr>
+          <p:cNvPr id="129" name="TextBox 128">
+            <a:extLst>
+              <a:ext uri="{FF2B5EF4-FFF2-40B4-BE49-F238E27FC236}">
+                <a16:creationId xmlns:a16="http://schemas.microsoft.com/office/drawing/2014/main" id="{D3820B48-DEE0-4344-8827-640B02ABEF15}"/>
+              </a:ext>
+            </a:extLst>
+          </p:cNvPr>
+          <p:cNvSpPr txBox="1"/>
+          <p:nvPr/>
+        </p:nvSpPr>
+        <p:spPr>
+          <a:xfrm>
+            <a:off x="5750062" y="4415250"/>
+            <a:ext cx="189257" cy="178683"/>
+          </a:xfrm>
+          <a:prstGeom prst="rect">
+            <a:avLst/>
+          </a:prstGeom>
+          <a:noFill/>
+        </p:spPr>
+        <p:txBody>
+          <a:bodyPr wrap="square" lIns="0" tIns="0" rIns="0" bIns="0" rtlCol="0">
+            <a:noAutofit/>
+          </a:bodyPr>
+          <a:lstStyle/>
+          <a:p>
+            <a:pPr algn="ctr"/>
+            <a:r>
+              <a:rPr lang="en-US" sz="1100">
+                <a:solidFill>
+                  <a:srgbClr val="7030A0"/>
+                </a:solidFill>
+              </a:rPr>
+              <a:t>1</a:t>
+            </a:r>
+            <a:endParaRPr lang="en-SG" sz="1100" dirty="0">
+              <a:solidFill>
+                <a:srgbClr val="7030A0"/>
+              </a:solidFill>
+            </a:endParaRPr>
+          </a:p>
+        </p:txBody>
+      </p:sp>
+      <p:sp>
+        <p:nvSpPr>
+          <p:cNvPr id="130" name="TextBox 129">
+            <a:extLst>
+              <a:ext uri="{FF2B5EF4-FFF2-40B4-BE49-F238E27FC236}">
+                <a16:creationId xmlns:a16="http://schemas.microsoft.com/office/drawing/2014/main" id="{804597DA-2E13-48E2-A30D-6AAC6C9E9415}"/>
+              </a:ext>
+            </a:extLst>
+          </p:cNvPr>
+          <p:cNvSpPr txBox="1"/>
+          <p:nvPr/>
+        </p:nvSpPr>
+        <p:spPr>
+          <a:xfrm>
+            <a:off x="7661475" y="3975480"/>
+            <a:ext cx="189257" cy="178683"/>
+          </a:xfrm>
+          <a:prstGeom prst="rect">
+            <a:avLst/>
+          </a:prstGeom>
+          <a:noFill/>
+        </p:spPr>
+        <p:txBody>
+          <a:bodyPr wrap="square" lIns="0" tIns="0" rIns="0" bIns="0" rtlCol="0">
+            <a:noAutofit/>
+          </a:bodyPr>
+          <a:lstStyle/>
+          <a:p>
+            <a:pPr algn="ctr"/>
+            <a:r>
+              <a:rPr lang="en-US" sz="1100" dirty="0">
+                <a:solidFill>
+                  <a:srgbClr val="7030A0"/>
+                </a:solidFill>
+              </a:rPr>
+              <a:t>1</a:t>
+            </a:r>
+            <a:endParaRPr lang="en-SG" sz="1100" dirty="0">
+              <a:solidFill>
+                <a:srgbClr val="7030A0"/>
+              </a:solidFill>
+            </a:endParaRPr>
+          </a:p>
+        </p:txBody>
+      </p:sp>
+      <p:sp>
+        <p:nvSpPr>
+          <p:cNvPr id="131" name="Flowchart: Decision 96">
+            <a:extLst>
+              <a:ext uri="{FF2B5EF4-FFF2-40B4-BE49-F238E27FC236}">
+                <a16:creationId xmlns:a16="http://schemas.microsoft.com/office/drawing/2014/main" id="{4A226395-608B-4C53-A219-B63833EE68B2}"/>
+              </a:ext>
+            </a:extLst>
+          </p:cNvPr>
+          <p:cNvSpPr/>
+          <p:nvPr/>
+        </p:nvSpPr>
+        <p:spPr>
+          <a:xfrm>
+            <a:off x="6556191" y="3833231"/>
             <a:ext cx="236048" cy="173380"/>
           </a:xfrm>
           <a:prstGeom prst="flowChartDecision">
             <a:avLst/>
           </a:prstGeom>
-          <a:noFill/>
+          <a:solidFill>
+            <a:srgbClr val="7030A0"/>
+          </a:solidFill>
           <a:ln w="19050">
             <a:solidFill>
               <a:srgbClr val="7030A0"/>
@@ -8922,262 +9779,6 @@
           </a:p>
         </p:txBody>
       </p:sp>
-      <p:cxnSp>
-        <p:nvCxnSpPr>
-          <p:cNvPr id="102" name="Elbow Connector 63">
-            <a:extLst>
-              <a:ext uri="{FF2B5EF4-FFF2-40B4-BE49-F238E27FC236}">
-                <a16:creationId xmlns:a16="http://schemas.microsoft.com/office/drawing/2014/main" id="{744F89C8-F729-4A40-ADF1-497CD98CD99C}"/>
-              </a:ext>
-            </a:extLst>
-          </p:cNvPr>
-          <p:cNvCxnSpPr>
-            <a:cxnSpLocks/>
-            <a:stCxn id="101" idx="3"/>
-            <a:endCxn id="216" idx="1"/>
-          </p:cNvCxnSpPr>
-          <p:nvPr/>
-        </p:nvCxnSpPr>
-        <p:spPr>
-          <a:xfrm>
-            <a:off x="5395527" y="3913494"/>
-            <a:ext cx="225333" cy="4999"/>
-          </a:xfrm>
-          <a:prstGeom prst="bentConnector3">
-            <a:avLst>
-              <a:gd name="adj1" fmla="val 50000"/>
-            </a:avLst>
-          </a:prstGeom>
-          <a:ln w="19050">
-            <a:solidFill>
-              <a:srgbClr val="7030A0"/>
-            </a:solidFill>
-            <a:headEnd type="none" w="med" len="med"/>
-            <a:tailEnd type="arrow" w="med" len="med"/>
-          </a:ln>
-          <a:effectLst/>
-        </p:spPr>
-        <p:style>
-          <a:lnRef idx="1">
-            <a:schemeClr val="accent2"/>
-          </a:lnRef>
-          <a:fillRef idx="2">
-            <a:schemeClr val="accent2"/>
-          </a:fillRef>
-          <a:effectRef idx="1">
-            <a:schemeClr val="accent2"/>
-          </a:effectRef>
-          <a:fontRef idx="minor">
-            <a:schemeClr val="dk1"/>
-          </a:fontRef>
-        </p:style>
-      </p:cxnSp>
-      <p:sp>
-        <p:nvSpPr>
-          <p:cNvPr id="105" name="TextBox 104">
-            <a:extLst>
-              <a:ext uri="{FF2B5EF4-FFF2-40B4-BE49-F238E27FC236}">
-                <a16:creationId xmlns:a16="http://schemas.microsoft.com/office/drawing/2014/main" id="{A846C247-5BE8-453B-94A4-F8D56DD4F771}"/>
-              </a:ext>
-            </a:extLst>
-          </p:cNvPr>
-          <p:cNvSpPr txBox="1"/>
-          <p:nvPr/>
-        </p:nvSpPr>
-        <p:spPr>
-          <a:xfrm>
-            <a:off x="5440463" y="3714522"/>
-            <a:ext cx="189257" cy="178683"/>
-          </a:xfrm>
-          <a:prstGeom prst="rect">
-            <a:avLst/>
-          </a:prstGeom>
-          <a:noFill/>
-        </p:spPr>
-        <p:txBody>
-          <a:bodyPr wrap="square" lIns="0" tIns="0" rIns="0" bIns="0" rtlCol="0">
-            <a:noAutofit/>
-          </a:bodyPr>
-          <a:lstStyle/>
-          <a:p>
-            <a:pPr algn="ctr"/>
-            <a:r>
-              <a:rPr lang="en-US" sz="1100" dirty="0">
-                <a:solidFill>
-                  <a:srgbClr val="7030A0"/>
-                </a:solidFill>
-              </a:rPr>
-              <a:t>1</a:t>
-            </a:r>
-            <a:endParaRPr lang="en-SG" sz="1100" dirty="0">
-              <a:solidFill>
-                <a:srgbClr val="7030A0"/>
-              </a:solidFill>
-            </a:endParaRPr>
-          </a:p>
-        </p:txBody>
-      </p:sp>
-      <p:sp>
-        <p:nvSpPr>
-          <p:cNvPr id="119" name="Rectangle 8">
-            <a:extLst>
-              <a:ext uri="{FF2B5EF4-FFF2-40B4-BE49-F238E27FC236}">
-                <a16:creationId xmlns:a16="http://schemas.microsoft.com/office/drawing/2014/main" id="{7C377596-E861-41BA-92F8-FB0DEFB5F5A9}"/>
-              </a:ext>
-            </a:extLst>
-          </p:cNvPr>
-          <p:cNvSpPr/>
-          <p:nvPr/>
-        </p:nvSpPr>
-        <p:spPr>
-          <a:xfrm>
-            <a:off x="3765267" y="4574115"/>
-            <a:ext cx="818980" cy="285783"/>
-          </a:xfrm>
-          <a:prstGeom prst="rect">
-            <a:avLst/>
-          </a:prstGeom>
-          <a:ln w="19050">
-            <a:solidFill>
-              <a:srgbClr val="7030A0"/>
-            </a:solidFill>
-          </a:ln>
-          <a:effectLst/>
-        </p:spPr>
-        <p:style>
-          <a:lnRef idx="1">
-            <a:schemeClr val="accent4"/>
-          </a:lnRef>
-          <a:fillRef idx="2">
-            <a:schemeClr val="accent4"/>
-          </a:fillRef>
-          <a:effectRef idx="1">
-            <a:schemeClr val="accent4"/>
-          </a:effectRef>
-          <a:fontRef idx="minor">
-            <a:schemeClr val="dk1"/>
-          </a:fontRef>
-        </p:style>
-        <p:txBody>
-          <a:bodyPr rtlCol="0" anchor="ctr"/>
-          <a:lstStyle/>
-          <a:p>
-            <a:pPr algn="ctr"/>
-            <a:r>
-              <a:rPr lang="en-US" sz="1050" dirty="0" err="1">
-                <a:solidFill>
-                  <a:srgbClr val="7030A0"/>
-                </a:solidFill>
-              </a:rPr>
-              <a:t>LoanStatus</a:t>
-            </a:r>
-            <a:endParaRPr lang="en-SG" sz="1050" dirty="0">
-              <a:solidFill>
-                <a:srgbClr val="7030A0"/>
-              </a:solidFill>
-            </a:endParaRPr>
-          </a:p>
-        </p:txBody>
-      </p:sp>
-      <p:cxnSp>
-        <p:nvCxnSpPr>
-          <p:cNvPr id="192" name="Elbow Connector 106">
-            <a:extLst>
-              <a:ext uri="{FF2B5EF4-FFF2-40B4-BE49-F238E27FC236}">
-                <a16:creationId xmlns:a16="http://schemas.microsoft.com/office/drawing/2014/main" id="{43BE3477-AF70-411F-A7C8-1BA6322922F2}"/>
-              </a:ext>
-            </a:extLst>
-          </p:cNvPr>
-          <p:cNvCxnSpPr>
-            <a:cxnSpLocks/>
-            <a:stCxn id="119" idx="1"/>
-            <a:endCxn id="190" idx="1"/>
-          </p:cNvCxnSpPr>
-          <p:nvPr/>
-        </p:nvCxnSpPr>
-        <p:spPr>
-          <a:xfrm rot="10800000" flipH="1" flipV="1">
-            <a:off x="3765267" y="4717006"/>
-            <a:ext cx="3631180" cy="1444169"/>
-          </a:xfrm>
-          <a:prstGeom prst="bentConnector3">
-            <a:avLst>
-              <a:gd name="adj1" fmla="val -3357"/>
-            </a:avLst>
-          </a:prstGeom>
-          <a:ln w="19050">
-            <a:solidFill>
-              <a:srgbClr val="7030A0"/>
-            </a:solidFill>
-            <a:prstDash val="solid"/>
-            <a:headEnd type="none" w="med" len="med"/>
-            <a:tailEnd type="triangle" w="med" len="med"/>
-          </a:ln>
-          <a:effectLst/>
-        </p:spPr>
-        <p:style>
-          <a:lnRef idx="1">
-            <a:schemeClr val="accent2"/>
-          </a:lnRef>
-          <a:fillRef idx="2">
-            <a:schemeClr val="accent2"/>
-          </a:fillRef>
-          <a:effectRef idx="1">
-            <a:schemeClr val="accent2"/>
-          </a:effectRef>
-          <a:fontRef idx="minor">
-            <a:schemeClr val="dk1"/>
-          </a:fontRef>
-        </p:style>
-      </p:cxnSp>
-      <p:cxnSp>
-        <p:nvCxnSpPr>
-          <p:cNvPr id="194" name="Elbow Connector 85">
-            <a:extLst>
-              <a:ext uri="{FF2B5EF4-FFF2-40B4-BE49-F238E27FC236}">
-                <a16:creationId xmlns:a16="http://schemas.microsoft.com/office/drawing/2014/main" id="{ABF032A2-D4AE-4AFA-AED2-456F7E127068}"/>
-              </a:ext>
-            </a:extLst>
-          </p:cNvPr>
-          <p:cNvCxnSpPr>
-            <a:cxnSpLocks/>
-            <a:stCxn id="176" idx="3"/>
-            <a:endCxn id="119" idx="3"/>
-          </p:cNvCxnSpPr>
-          <p:nvPr/>
-        </p:nvCxnSpPr>
-        <p:spPr>
-          <a:xfrm rot="5400000">
-            <a:off x="4451137" y="4447228"/>
-            <a:ext cx="402889" cy="136668"/>
-          </a:xfrm>
-          <a:prstGeom prst="bentConnector2">
-            <a:avLst/>
-          </a:prstGeom>
-          <a:ln w="19050">
-            <a:solidFill>
-              <a:srgbClr val="7030A0"/>
-            </a:solidFill>
-            <a:headEnd type="none" w="med" len="med"/>
-            <a:tailEnd type="arrow" w="med" len="med"/>
-          </a:ln>
-          <a:effectLst/>
-        </p:spPr>
-        <p:style>
-          <a:lnRef idx="1">
-            <a:schemeClr val="accent2"/>
-          </a:lnRef>
-          <a:fillRef idx="2">
-            <a:schemeClr val="accent2"/>
-          </a:fillRef>
-          <a:effectRef idx="1">
-            <a:schemeClr val="accent2"/>
-          </a:effectRef>
-          <a:fontRef idx="minor">
-            <a:schemeClr val="dk1"/>
-          </a:fontRef>
-        </p:style>
-      </p:cxnSp>
     </p:spTree>
     <p:extLst>
       <p:ext uri="{BB962C8B-B14F-4D97-AF65-F5344CB8AC3E}">

</xml_diff>